<commit_message>
Final Presentation Milestone 1
</commit_message>
<xml_diff>
--- a/images/Presentation2.pptx
+++ b/images/Presentation2.pptx
@@ -2,21 +2,25 @@
 <file path=ppt/presentation.xml><?xml version="1.0" encoding="utf-8"?>
 <p:presentation xmlns:a="http://schemas.openxmlformats.org/drawingml/2006/main" xmlns:r="http://schemas.openxmlformats.org/officeDocument/2006/relationships" xmlns:p="http://schemas.openxmlformats.org/presentationml/2006/main" saveSubsetFonts="1" autoCompressPictures="0">
   <p:sldMasterIdLst>
-    <p:sldMasterId id="2147483702" r:id="rId1"/>
+    <p:sldMasterId id="2147483797" r:id="rId1"/>
   </p:sldMasterIdLst>
   <p:notesMasterIdLst>
-    <p:notesMasterId r:id="rId11"/>
+    <p:notesMasterId r:id="rId15"/>
   </p:notesMasterIdLst>
   <p:sldIdLst>
     <p:sldId id="256" r:id="rId2"/>
-    <p:sldId id="260" r:id="rId3"/>
-    <p:sldId id="257" r:id="rId4"/>
-    <p:sldId id="258" r:id="rId5"/>
-    <p:sldId id="259" r:id="rId6"/>
-    <p:sldId id="261" r:id="rId7"/>
-    <p:sldId id="262" r:id="rId8"/>
-    <p:sldId id="263" r:id="rId9"/>
-    <p:sldId id="264" r:id="rId10"/>
+    <p:sldId id="266" r:id="rId3"/>
+    <p:sldId id="265" r:id="rId4"/>
+    <p:sldId id="260" r:id="rId5"/>
+    <p:sldId id="257" r:id="rId6"/>
+    <p:sldId id="258" r:id="rId7"/>
+    <p:sldId id="259" r:id="rId8"/>
+    <p:sldId id="261" r:id="rId9"/>
+    <p:sldId id="262" r:id="rId10"/>
+    <p:sldId id="263" r:id="rId11"/>
+    <p:sldId id="267" r:id="rId12"/>
+    <p:sldId id="264" r:id="rId13"/>
+    <p:sldId id="268" r:id="rId14"/>
   </p:sldIdLst>
   <p:sldSz cx="12192000" cy="6858000"/>
   <p:notesSz cx="6858000" cy="9144000"/>
@@ -115,6 +119,11 @@
       </a:defRPr>
     </a:lvl9pPr>
   </p:defaultTextStyle>
+  <p:extLst>
+    <p:ext uri="{EFAFB233-063F-42B5-8137-9DF3F51BA10A}">
+      <p15:sldGuideLst xmlns:p15="http://schemas.microsoft.com/office/powerpoint/2012/main"/>
+    </p:ext>
+  </p:extLst>
 </p:presentation>
 </file>
 
@@ -200,7 +209,7 @@
           <a:p>
             <a:fld id="{B9ACFC22-06D6-C245-973F-89D91899CA6F}" type="datetimeFigureOut">
               <a:rPr lang="en-US" smtClean="0"/>
-              <a:t>3/18/17</a:t>
+              <a:t>3/19/17</a:t>
             </a:fld>
             <a:endParaRPr lang="en-US"/>
           </a:p>
@@ -469,8 +478,16 @@
 </file>
 
 <file path=ppt/slideLayouts/slideLayout1.xml><?xml version="1.0" encoding="utf-8"?>
-<p:sldLayout xmlns:a="http://schemas.openxmlformats.org/drawingml/2006/main" xmlns:r="http://schemas.openxmlformats.org/officeDocument/2006/relationships" xmlns:p="http://schemas.openxmlformats.org/presentationml/2006/main" type="title" preserve="1">
+<p:sldLayout xmlns:a="http://schemas.openxmlformats.org/drawingml/2006/main" xmlns:r="http://schemas.openxmlformats.org/officeDocument/2006/relationships" xmlns:p="http://schemas.openxmlformats.org/presentationml/2006/main" showMasterSp="0" type="title" preserve="1">
   <p:cSld name="Title Slide">
+    <p:bg>
+      <p:bgPr>
+        <a:solidFill>
+          <a:schemeClr val="bg2"/>
+        </a:solidFill>
+        <a:effectLst/>
+      </p:bgPr>
+    </p:bg>
     <p:spTree>
       <p:nvGrpSpPr>
         <p:cNvPr id="1" name=""/>
@@ -497,15 +514,21 @@
         </p:nvSpPr>
         <p:spPr>
           <a:xfrm>
-            <a:off x="1524000" y="1122363"/>
-            <a:ext cx="9144000" cy="2387600"/>
-          </a:xfrm>
-        </p:spPr>
-        <p:txBody>
-          <a:bodyPr anchor="b"/>
+            <a:off x="1915128" y="1788454"/>
+            <a:ext cx="8361229" cy="2098226"/>
+          </a:xfrm>
+        </p:spPr>
+        <p:txBody>
+          <a:bodyPr anchor="b">
+            <a:noAutofit/>
+          </a:bodyPr>
           <a:lstStyle>
             <a:lvl1pPr algn="ctr">
-              <a:defRPr sz="6000"/>
+              <a:defRPr sz="7200" cap="all" baseline="0">
+                <a:solidFill>
+                  <a:schemeClr val="tx2"/>
+                </a:solidFill>
+              </a:defRPr>
             </a:lvl1pPr>
           </a:lstStyle>
           <a:p>
@@ -513,7 +536,7 @@
               <a:rPr lang="en-US" smtClean="0"/>
               <a:t>Click to edit Master title style</a:t>
             </a:r>
-            <a:endParaRPr lang="en-US"/>
+            <a:endParaRPr lang="en-US" dirty="0"/>
           </a:p>
         </p:txBody>
       </p:sp>
@@ -529,16 +552,27 @@
         </p:nvSpPr>
         <p:spPr>
           <a:xfrm>
-            <a:off x="1524000" y="3602038"/>
-            <a:ext cx="9144000" cy="1655762"/>
-          </a:xfrm>
-        </p:spPr>
-        <p:txBody>
-          <a:bodyPr/>
+            <a:off x="2679906" y="3956279"/>
+            <a:ext cx="6831673" cy="1086237"/>
+          </a:xfrm>
+        </p:spPr>
+        <p:txBody>
+          <a:bodyPr>
+            <a:normAutofit/>
+          </a:bodyPr>
           <a:lstStyle>
             <a:lvl1pPr marL="0" indent="0" algn="ctr">
-              <a:buNone/>
-              <a:defRPr sz="2400"/>
+              <a:lnSpc>
+                <a:spcPct val="112000"/>
+              </a:lnSpc>
+              <a:spcBef>
+                <a:spcPts val="0"/>
+              </a:spcBef>
+              <a:spcAft>
+                <a:spcPts val="0"/>
+              </a:spcAft>
+              <a:buNone/>
+              <a:defRPr sz="2300"/>
             </a:lvl1pPr>
             <a:lvl2pPr marL="457200" indent="0" algn="ctr">
               <a:buNone/>
@@ -578,7 +612,7 @@
               <a:rPr lang="en-US" smtClean="0"/>
               <a:t>Click to edit Master subtitle style</a:t>
             </a:r>
-            <a:endParaRPr lang="en-US"/>
+            <a:endParaRPr lang="en-US" dirty="0"/>
           </a:p>
         </p:txBody>
       </p:sp>
@@ -592,14 +626,27 @@
             <p:ph type="dt" sz="half" idx="10"/>
           </p:nvPr>
         </p:nvSpPr>
-        <p:spPr/>
+        <p:spPr>
+          <a:xfrm>
+            <a:off x="752858" y="6453386"/>
+            <a:ext cx="1607944" cy="404614"/>
+          </a:xfrm>
+        </p:spPr>
         <p:txBody>
           <a:bodyPr/>
-          <a:lstStyle/>
+          <a:lstStyle>
+            <a:lvl1pPr>
+              <a:defRPr baseline="0">
+                <a:solidFill>
+                  <a:schemeClr val="tx2"/>
+                </a:solidFill>
+              </a:defRPr>
+            </a:lvl1pPr>
+          </a:lstStyle>
           <a:p>
             <a:fld id="{63103B83-DECA-9D4F-ADBD-5F3BB2ACF0D5}" type="datetimeFigureOut">
               <a:rPr lang="en-US" smtClean="0"/>
-              <a:t>3/18/17</a:t>
+              <a:t>3/19/17</a:t>
             </a:fld>
             <a:endParaRPr lang="en-US"/>
           </a:p>
@@ -615,10 +662,23 @@
             <p:ph type="ftr" sz="quarter" idx="11"/>
           </p:nvPr>
         </p:nvSpPr>
-        <p:spPr/>
+        <p:spPr>
+          <a:xfrm>
+            <a:off x="2584054" y="6453386"/>
+            <a:ext cx="7023377" cy="404614"/>
+          </a:xfrm>
+        </p:spPr>
         <p:txBody>
           <a:bodyPr/>
-          <a:lstStyle/>
+          <a:lstStyle>
+            <a:lvl1pPr algn="ctr">
+              <a:defRPr baseline="0">
+                <a:solidFill>
+                  <a:schemeClr val="tx2"/>
+                </a:solidFill>
+              </a:defRPr>
+            </a:lvl1pPr>
+          </a:lstStyle>
           <a:p>
             <a:endParaRPr lang="en-US"/>
           </a:p>
@@ -634,10 +694,23 @@
             <p:ph type="sldNum" sz="quarter" idx="12"/>
           </p:nvPr>
         </p:nvSpPr>
-        <p:spPr/>
+        <p:spPr>
+          <a:xfrm>
+            <a:off x="9830683" y="6453386"/>
+            <a:ext cx="1596292" cy="404614"/>
+          </a:xfrm>
+        </p:spPr>
         <p:txBody>
           <a:bodyPr/>
-          <a:lstStyle/>
+          <a:lstStyle>
+            <a:lvl1pPr>
+              <a:defRPr baseline="0">
+                <a:solidFill>
+                  <a:schemeClr val="tx2"/>
+                </a:solidFill>
+              </a:defRPr>
+            </a:lvl1pPr>
+          </a:lstStyle>
           <a:p>
             <a:fld id="{F34B119F-5F17-E748-9E84-C55301851A38}" type="slidenum">
               <a:rPr lang="en-US" smtClean="0"/>
@@ -647,11 +720,150 @@
           </a:p>
         </p:txBody>
       </p:sp>
+      <p:grpSp>
+        <p:nvGrpSpPr>
+          <p:cNvPr id="7" name="Group 6"/>
+          <p:cNvGrpSpPr/>
+          <p:nvPr/>
+        </p:nvGrpSpPr>
+        <p:grpSpPr>
+          <a:xfrm>
+            <a:off x="752858" y="744469"/>
+            <a:ext cx="10674117" cy="5349671"/>
+            <a:chOff x="752858" y="744469"/>
+            <a:chExt cx="10674117" cy="5349671"/>
+          </a:xfrm>
+        </p:grpSpPr>
+        <p:sp>
+          <p:nvSpPr>
+            <p:cNvPr id="11" name="Freeform 6"/>
+            <p:cNvSpPr/>
+            <p:nvPr/>
+          </p:nvSpPr>
+          <p:spPr bwMode="auto">
+            <a:xfrm>
+              <a:off x="8151962" y="1685652"/>
+              <a:ext cx="3275013" cy="4408488"/>
+            </a:xfrm>
+            <a:custGeom>
+              <a:avLst/>
+              <a:gdLst/>
+              <a:ahLst/>
+              <a:cxnLst/>
+              <a:rect l="l" t="t" r="r" b="b"/>
+              <a:pathLst>
+                <a:path w="10000" h="10000">
+                  <a:moveTo>
+                    <a:pt x="8761" y="0"/>
+                  </a:moveTo>
+                  <a:lnTo>
+                    <a:pt x="10000" y="0"/>
+                  </a:lnTo>
+                  <a:lnTo>
+                    <a:pt x="10000" y="10000"/>
+                  </a:lnTo>
+                  <a:lnTo>
+                    <a:pt x="0" y="10000"/>
+                  </a:lnTo>
+                  <a:lnTo>
+                    <a:pt x="0" y="9126"/>
+                  </a:lnTo>
+                  <a:lnTo>
+                    <a:pt x="8761" y="9127"/>
+                  </a:lnTo>
+                  <a:lnTo>
+                    <a:pt x="8761" y="0"/>
+                  </a:lnTo>
+                  <a:close/>
+                </a:path>
+              </a:pathLst>
+            </a:custGeom>
+            <a:solidFill>
+              <a:schemeClr val="tx2"/>
+            </a:solidFill>
+            <a:ln w="0">
+              <a:noFill/>
+              <a:prstDash val="solid"/>
+              <a:round/>
+              <a:headEnd/>
+              <a:tailEnd/>
+            </a:ln>
+          </p:spPr>
+        </p:sp>
+        <p:sp>
+          <p:nvSpPr>
+            <p:cNvPr id="14" name="Freeform 6"/>
+            <p:cNvSpPr/>
+            <p:nvPr/>
+          </p:nvSpPr>
+          <p:spPr bwMode="auto">
+            <a:xfrm flipH="1" flipV="1">
+              <a:off x="752858" y="744469"/>
+              <a:ext cx="3275668" cy="4408488"/>
+            </a:xfrm>
+            <a:custGeom>
+              <a:avLst/>
+              <a:gdLst/>
+              <a:ahLst/>
+              <a:cxnLst/>
+              <a:rect l="l" t="t" r="r" b="b"/>
+              <a:pathLst>
+                <a:path w="10002" h="10000">
+                  <a:moveTo>
+                    <a:pt x="8763" y="0"/>
+                  </a:moveTo>
+                  <a:lnTo>
+                    <a:pt x="10002" y="0"/>
+                  </a:lnTo>
+                  <a:lnTo>
+                    <a:pt x="10002" y="10000"/>
+                  </a:lnTo>
+                  <a:lnTo>
+                    <a:pt x="2" y="10000"/>
+                  </a:lnTo>
+                  <a:cubicBezTo>
+                    <a:pt x="-2" y="9698"/>
+                    <a:pt x="4" y="9427"/>
+                    <a:pt x="0" y="9125"/>
+                  </a:cubicBezTo>
+                  <a:lnTo>
+                    <a:pt x="8763" y="9128"/>
+                  </a:lnTo>
+                  <a:lnTo>
+                    <a:pt x="8763" y="0"/>
+                  </a:lnTo>
+                  <a:close/>
+                </a:path>
+              </a:pathLst>
+            </a:custGeom>
+            <a:solidFill>
+              <a:schemeClr val="tx2"/>
+            </a:solidFill>
+            <a:ln w="0">
+              <a:noFill/>
+              <a:prstDash val="solid"/>
+              <a:round/>
+              <a:headEnd/>
+              <a:tailEnd/>
+            </a:ln>
+          </p:spPr>
+        </p:sp>
+      </p:grpSp>
     </p:spTree>
+    <p:extLst>
+      <p:ext uri="{BB962C8B-B14F-4D97-AF65-F5344CB8AC3E}">
+        <p14:creationId xmlns:p14="http://schemas.microsoft.com/office/powerpoint/2010/main" val="233675013"/>
+      </p:ext>
+    </p:extLst>
   </p:cSld>
   <p:clrMapOvr>
-    <a:masterClrMapping/>
+    <a:overrideClrMapping bg1="lt1" tx1="dk1" bg2="lt2" tx2="dk2" accent1="accent1" accent2="accent2" accent3="accent3" accent4="accent4" accent5="accent5" accent6="accent6" hlink="hlink" folHlink="folHlink"/>
   </p:clrMapOvr>
+  <p:extLst>
+    <p:ext uri="{DCECCB84-F9BA-43D5-87BE-67443E8EF086}">
+      <p15:sldGuideLst xmlns:p15="http://schemas.microsoft.com/office/powerpoint/2012/main"/>
+    </p:ext>
+  </p:extLst>
 </p:sldLayout>
 </file>
 
@@ -691,7 +903,7 @@
               <a:rPr lang="en-US" smtClean="0"/>
               <a:t>Click to edit Master title style</a:t>
             </a:r>
-            <a:endParaRPr lang="en-US"/>
+            <a:endParaRPr lang="en-US" dirty="0"/>
           </a:p>
         </p:txBody>
       </p:sp>
@@ -705,7 +917,12 @@
             <p:ph type="body" orient="vert" idx="1"/>
           </p:nvPr>
         </p:nvSpPr>
-        <p:spPr/>
+        <p:spPr>
+          <a:xfrm>
+            <a:off x="1371600" y="2295525"/>
+            <a:ext cx="9601200" cy="3571875"/>
+          </a:xfrm>
+        </p:spPr>
         <p:txBody>
           <a:bodyPr vert="eaVert"/>
           <a:lstStyle/>
@@ -743,7 +960,7 @@
               <a:rPr lang="en-US" smtClean="0"/>
               <a:t>Fifth level</a:t>
             </a:r>
-            <a:endParaRPr lang="en-US"/>
+            <a:endParaRPr lang="en-US" dirty="0"/>
           </a:p>
         </p:txBody>
       </p:sp>
@@ -764,7 +981,7 @@
           <a:p>
             <a:fld id="{63103B83-DECA-9D4F-ADBD-5F3BB2ACF0D5}" type="datetimeFigureOut">
               <a:rPr lang="en-US" smtClean="0"/>
-              <a:t>3/18/17</a:t>
+              <a:t>3/19/17</a:t>
             </a:fld>
             <a:endParaRPr lang="en-US"/>
           </a:p>
@@ -813,6 +1030,11 @@
         </p:txBody>
       </p:sp>
     </p:spTree>
+    <p:extLst>
+      <p:ext uri="{BB962C8B-B14F-4D97-AF65-F5344CB8AC3E}">
+        <p14:creationId xmlns:p14="http://schemas.microsoft.com/office/powerpoint/2010/main" val="997986387"/>
+      </p:ext>
+    </p:extLst>
   </p:cSld>
   <p:clrMapOvr>
     <a:masterClrMapping/>
@@ -849,8 +1071,8 @@
         </p:nvSpPr>
         <p:spPr>
           <a:xfrm>
-            <a:off x="8724900" y="365125"/>
-            <a:ext cx="2628900" cy="5811838"/>
+            <a:off x="9596561" y="624156"/>
+            <a:ext cx="1565766" cy="5243244"/>
           </a:xfrm>
         </p:spPr>
         <p:txBody>
@@ -861,7 +1083,7 @@
               <a:rPr lang="en-US" smtClean="0"/>
               <a:t>Click to edit Master title style</a:t>
             </a:r>
-            <a:endParaRPr lang="en-US"/>
+            <a:endParaRPr lang="en-US" dirty="0"/>
           </a:p>
         </p:txBody>
       </p:sp>
@@ -877,8 +1099,8 @@
         </p:nvSpPr>
         <p:spPr>
           <a:xfrm>
-            <a:off x="838200" y="365125"/>
-            <a:ext cx="7734300" cy="5811838"/>
+            <a:off x="1371600" y="624156"/>
+            <a:ext cx="8179641" cy="5243244"/>
           </a:xfrm>
         </p:spPr>
         <p:txBody>
@@ -918,7 +1140,7 @@
               <a:rPr lang="en-US" smtClean="0"/>
               <a:t>Fifth level</a:t>
             </a:r>
-            <a:endParaRPr lang="en-US"/>
+            <a:endParaRPr lang="en-US" dirty="0"/>
           </a:p>
         </p:txBody>
       </p:sp>
@@ -939,7 +1161,7 @@
           <a:p>
             <a:fld id="{63103B83-DECA-9D4F-ADBD-5F3BB2ACF0D5}" type="datetimeFigureOut">
               <a:rPr lang="en-US" smtClean="0"/>
-              <a:t>3/18/17</a:t>
+              <a:t>3/19/17</a:t>
             </a:fld>
             <a:endParaRPr lang="en-US"/>
           </a:p>
@@ -988,6 +1210,11 @@
         </p:txBody>
       </p:sp>
     </p:spTree>
+    <p:extLst>
+      <p:ext uri="{BB962C8B-B14F-4D97-AF65-F5344CB8AC3E}">
+        <p14:creationId xmlns:p14="http://schemas.microsoft.com/office/powerpoint/2010/main" val="1309923239"/>
+      </p:ext>
+    </p:extLst>
   </p:cSld>
   <p:clrMapOvr>
     <a:masterClrMapping/>
@@ -1031,7 +1258,7 @@
               <a:rPr lang="en-US" smtClean="0"/>
               <a:t>Click to edit Master title style</a:t>
             </a:r>
-            <a:endParaRPr lang="en-US"/>
+            <a:endParaRPr lang="en-US" dirty="0"/>
           </a:p>
         </p:txBody>
       </p:sp>
@@ -1083,7 +1310,7 @@
               <a:rPr lang="en-US" smtClean="0"/>
               <a:t>Fifth level</a:t>
             </a:r>
-            <a:endParaRPr lang="en-US"/>
+            <a:endParaRPr lang="en-US" dirty="0"/>
           </a:p>
         </p:txBody>
       </p:sp>
@@ -1104,7 +1331,7 @@
           <a:p>
             <a:fld id="{63103B83-DECA-9D4F-ADBD-5F3BB2ACF0D5}" type="datetimeFigureOut">
               <a:rPr lang="en-US" smtClean="0"/>
-              <a:t>3/18/17</a:t>
+              <a:t>3/19/17</a:t>
             </a:fld>
             <a:endParaRPr lang="en-US"/>
           </a:p>
@@ -1153,6 +1380,11 @@
         </p:txBody>
       </p:sp>
     </p:spTree>
+    <p:extLst>
+      <p:ext uri="{BB962C8B-B14F-4D97-AF65-F5344CB8AC3E}">
+        <p14:creationId xmlns:p14="http://schemas.microsoft.com/office/powerpoint/2010/main" val="1775836775"/>
+      </p:ext>
+    </p:extLst>
   </p:cSld>
   <p:clrMapOvr>
     <a:masterClrMapping/>
@@ -1161,8 +1393,13 @@
 </file>
 
 <file path=ppt/slideLayouts/slideLayout3.xml><?xml version="1.0" encoding="utf-8"?>
-<p:sldLayout xmlns:a="http://schemas.openxmlformats.org/drawingml/2006/main" xmlns:r="http://schemas.openxmlformats.org/officeDocument/2006/relationships" xmlns:p="http://schemas.openxmlformats.org/presentationml/2006/main" type="secHead" preserve="1">
+<p:sldLayout xmlns:a="http://schemas.openxmlformats.org/drawingml/2006/main" xmlns:r="http://schemas.openxmlformats.org/officeDocument/2006/relationships" xmlns:p="http://schemas.openxmlformats.org/presentationml/2006/main" showMasterSp="0" type="secHead" preserve="1">
   <p:cSld name="Section Header">
+    <p:bg>
+      <p:bgRef idx="1001">
+        <a:schemeClr val="bg2"/>
+      </p:bgRef>
+    </p:bg>
     <p:spTree>
       <p:nvGrpSpPr>
         <p:cNvPr id="1" name=""/>
@@ -1189,15 +1426,21 @@
         </p:nvSpPr>
         <p:spPr>
           <a:xfrm>
-            <a:off x="831850" y="1709738"/>
-            <a:ext cx="10515600" cy="2852737"/>
-          </a:xfrm>
-        </p:spPr>
-        <p:txBody>
-          <a:bodyPr anchor="b"/>
+            <a:off x="765025" y="1301360"/>
+            <a:ext cx="9612971" cy="2852737"/>
+          </a:xfrm>
+        </p:spPr>
+        <p:txBody>
+          <a:bodyPr anchor="b">
+            <a:normAutofit/>
+          </a:bodyPr>
           <a:lstStyle>
-            <a:lvl1pPr>
-              <a:defRPr sz="6000"/>
+            <a:lvl1pPr algn="r">
+              <a:defRPr sz="7200" cap="all" baseline="0">
+                <a:solidFill>
+                  <a:schemeClr val="tx2"/>
+                </a:solidFill>
+              </a:defRPr>
             </a:lvl1pPr>
           </a:lstStyle>
           <a:p>
@@ -1205,7 +1448,7 @@
               <a:rPr lang="en-US" smtClean="0"/>
               <a:t>Click to edit Master title style</a:t>
             </a:r>
-            <a:endParaRPr lang="en-US"/>
+            <a:endParaRPr lang="en-US" dirty="0"/>
           </a:p>
         </p:txBody>
       </p:sp>
@@ -1221,20 +1464,27 @@
         </p:nvSpPr>
         <p:spPr>
           <a:xfrm>
-            <a:off x="831850" y="4589463"/>
-            <a:ext cx="10515600" cy="1500187"/>
+            <a:off x="765025" y="4216328"/>
+            <a:ext cx="9612971" cy="1143324"/>
           </a:xfrm>
         </p:spPr>
         <p:txBody>
           <a:bodyPr/>
           <a:lstStyle>
-            <a:lvl1pPr marL="0" indent="0">
+            <a:lvl1pPr marL="0" indent="0" algn="r">
+              <a:lnSpc>
+                <a:spcPct val="112000"/>
+              </a:lnSpc>
+              <a:spcBef>
+                <a:spcPts val="0"/>
+              </a:spcBef>
+              <a:spcAft>
+                <a:spcPts val="0"/>
+              </a:spcAft>
               <a:buNone/>
               <a:defRPr sz="2400">
                 <a:solidFill>
-                  <a:schemeClr val="tx1">
-                    <a:tint val="75000"/>
-                  </a:schemeClr>
+                  <a:schemeClr val="tx2"/>
                 </a:solidFill>
               </a:defRPr>
             </a:lvl1pPr>
@@ -1338,14 +1588,27 @@
             <p:ph type="dt" sz="half" idx="10"/>
           </p:nvPr>
         </p:nvSpPr>
-        <p:spPr/>
+        <p:spPr>
+          <a:xfrm>
+            <a:off x="738908" y="6453386"/>
+            <a:ext cx="1622409" cy="404614"/>
+          </a:xfrm>
+        </p:spPr>
         <p:txBody>
           <a:bodyPr/>
-          <a:lstStyle/>
+          <a:lstStyle>
+            <a:lvl1pPr>
+              <a:defRPr>
+                <a:solidFill>
+                  <a:schemeClr val="tx2"/>
+                </a:solidFill>
+              </a:defRPr>
+            </a:lvl1pPr>
+          </a:lstStyle>
           <a:p>
             <a:fld id="{63103B83-DECA-9D4F-ADBD-5F3BB2ACF0D5}" type="datetimeFigureOut">
               <a:rPr lang="en-US" smtClean="0"/>
-              <a:t>3/18/17</a:t>
+              <a:t>3/19/17</a:t>
             </a:fld>
             <a:endParaRPr lang="en-US"/>
           </a:p>
@@ -1361,10 +1624,23 @@
             <p:ph type="ftr" sz="quarter" idx="11"/>
           </p:nvPr>
         </p:nvSpPr>
-        <p:spPr/>
+        <p:spPr>
+          <a:xfrm>
+            <a:off x="2584312" y="6453386"/>
+            <a:ext cx="7023377" cy="404614"/>
+          </a:xfrm>
+        </p:spPr>
         <p:txBody>
           <a:bodyPr/>
-          <a:lstStyle/>
+          <a:lstStyle>
+            <a:lvl1pPr algn="ctr">
+              <a:defRPr>
+                <a:solidFill>
+                  <a:schemeClr val="tx2"/>
+                </a:solidFill>
+              </a:defRPr>
+            </a:lvl1pPr>
+          </a:lstStyle>
           <a:p>
             <a:endParaRPr lang="en-US"/>
           </a:p>
@@ -1380,10 +1656,23 @@
             <p:ph type="sldNum" sz="quarter" idx="12"/>
           </p:nvPr>
         </p:nvSpPr>
-        <p:spPr/>
+        <p:spPr>
+          <a:xfrm>
+            <a:off x="9830683" y="6453386"/>
+            <a:ext cx="1596292" cy="404614"/>
+          </a:xfrm>
+        </p:spPr>
         <p:txBody>
           <a:bodyPr/>
-          <a:lstStyle/>
+          <a:lstStyle>
+            <a:lvl1pPr>
+              <a:defRPr>
+                <a:solidFill>
+                  <a:schemeClr val="tx2"/>
+                </a:solidFill>
+              </a:defRPr>
+            </a:lvl1pPr>
+          </a:lstStyle>
           <a:p>
             <a:fld id="{F34B119F-5F17-E748-9E84-C55301851A38}" type="slidenum">
               <a:rPr lang="en-US" smtClean="0"/>
@@ -1393,10 +1682,71 @@
           </a:p>
         </p:txBody>
       </p:sp>
+      <p:sp>
+        <p:nvSpPr>
+          <p:cNvPr id="7" name="Freeform 6" title="Crop Mark"/>
+          <p:cNvSpPr/>
+          <p:nvPr/>
+        </p:nvSpPr>
+        <p:spPr bwMode="auto">
+          <a:xfrm>
+            <a:off x="8151962" y="1685652"/>
+            <a:ext cx="3275013" cy="4408488"/>
+          </a:xfrm>
+          <a:custGeom>
+            <a:avLst/>
+            <a:gdLst/>
+            <a:ahLst/>
+            <a:cxnLst/>
+            <a:rect l="0" t="0" r="r" b="b"/>
+            <a:pathLst>
+              <a:path w="4125" h="5554">
+                <a:moveTo>
+                  <a:pt x="3614" y="0"/>
+                </a:moveTo>
+                <a:lnTo>
+                  <a:pt x="4125" y="0"/>
+                </a:lnTo>
+                <a:lnTo>
+                  <a:pt x="4125" y="5554"/>
+                </a:lnTo>
+                <a:lnTo>
+                  <a:pt x="0" y="5554"/>
+                </a:lnTo>
+                <a:lnTo>
+                  <a:pt x="0" y="5074"/>
+                </a:lnTo>
+                <a:lnTo>
+                  <a:pt x="3614" y="5074"/>
+                </a:lnTo>
+                <a:lnTo>
+                  <a:pt x="3614" y="0"/>
+                </a:lnTo>
+                <a:close/>
+              </a:path>
+            </a:pathLst>
+          </a:custGeom>
+          <a:solidFill>
+            <a:schemeClr val="tx2"/>
+          </a:solidFill>
+          <a:ln w="0">
+            <a:noFill/>
+            <a:prstDash val="solid"/>
+            <a:round/>
+            <a:headEnd/>
+            <a:tailEnd/>
+          </a:ln>
+        </p:spPr>
+      </p:sp>
     </p:spTree>
+    <p:extLst>
+      <p:ext uri="{BB962C8B-B14F-4D97-AF65-F5344CB8AC3E}">
+        <p14:creationId xmlns:p14="http://schemas.microsoft.com/office/powerpoint/2010/main" val="760951419"/>
+      </p:ext>
+    </p:extLst>
   </p:cSld>
   <p:clrMapOvr>
-    <a:masterClrMapping/>
+    <a:overrideClrMapping bg1="dk1" tx1="lt1" bg2="dk2" tx2="lt2" accent1="accent1" accent2="accent2" accent3="accent3" accent4="accent4" accent5="accent5" accent6="accent6" hlink="hlink" folHlink="folHlink"/>
   </p:clrMapOvr>
 </p:sldLayout>
 </file>
@@ -1431,13 +1781,21 @@
         <p:spPr/>
         <p:txBody>
           <a:bodyPr/>
-          <a:lstStyle/>
+          <a:lstStyle>
+            <a:lvl1pPr>
+              <a:defRPr>
+                <a:solidFill>
+                  <a:schemeClr val="tx2"/>
+                </a:solidFill>
+              </a:defRPr>
+            </a:lvl1pPr>
+          </a:lstStyle>
           <a:p>
             <a:r>
               <a:rPr lang="en-US" smtClean="0"/>
               <a:t>Click to edit Master title style</a:t>
             </a:r>
-            <a:endParaRPr lang="en-US"/>
+            <a:endParaRPr lang="en-US" dirty="0"/>
           </a:p>
         </p:txBody>
       </p:sp>
@@ -1453,126 +1811,198 @@
         </p:nvSpPr>
         <p:spPr>
           <a:xfrm>
-            <a:off x="838200" y="1825625"/>
-            <a:ext cx="5181600" cy="4351338"/>
-          </a:xfrm>
-        </p:spPr>
+            <a:off x="1371600" y="2285999"/>
+            <a:ext cx="4447786" cy="3581401"/>
+          </a:xfrm>
+        </p:spPr>
+        <p:txBody>
+          <a:bodyPr/>
+          <a:lstStyle>
+            <a:lvl1pPr>
+              <a:defRPr baseline="0">
+                <a:solidFill>
+                  <a:schemeClr val="tx2"/>
+                </a:solidFill>
+              </a:defRPr>
+            </a:lvl1pPr>
+            <a:lvl2pPr>
+              <a:defRPr baseline="0">
+                <a:solidFill>
+                  <a:schemeClr val="tx2"/>
+                </a:solidFill>
+              </a:defRPr>
+            </a:lvl2pPr>
+            <a:lvl3pPr>
+              <a:defRPr baseline="0">
+                <a:solidFill>
+                  <a:schemeClr val="tx2"/>
+                </a:solidFill>
+              </a:defRPr>
+            </a:lvl3pPr>
+            <a:lvl4pPr>
+              <a:defRPr baseline="0">
+                <a:solidFill>
+                  <a:schemeClr val="tx2"/>
+                </a:solidFill>
+              </a:defRPr>
+            </a:lvl4pPr>
+            <a:lvl5pPr>
+              <a:defRPr baseline="0">
+                <a:solidFill>
+                  <a:schemeClr val="tx2"/>
+                </a:solidFill>
+              </a:defRPr>
+            </a:lvl5pPr>
+          </a:lstStyle>
+          <a:p>
+            <a:pPr lvl="0"/>
+            <a:r>
+              <a:rPr lang="en-US" smtClean="0"/>
+              <a:t>Click to edit Master text styles</a:t>
+            </a:r>
+          </a:p>
+          <a:p>
+            <a:pPr lvl="1"/>
+            <a:r>
+              <a:rPr lang="en-US" smtClean="0"/>
+              <a:t>Second level</a:t>
+            </a:r>
+          </a:p>
+          <a:p>
+            <a:pPr lvl="2"/>
+            <a:r>
+              <a:rPr lang="en-US" smtClean="0"/>
+              <a:t>Third level</a:t>
+            </a:r>
+          </a:p>
+          <a:p>
+            <a:pPr lvl="3"/>
+            <a:r>
+              <a:rPr lang="en-US" smtClean="0"/>
+              <a:t>Fourth level</a:t>
+            </a:r>
+          </a:p>
+          <a:p>
+            <a:pPr lvl="4"/>
+            <a:r>
+              <a:rPr lang="en-US" smtClean="0"/>
+              <a:t>Fifth level</a:t>
+            </a:r>
+            <a:endParaRPr lang="en-US" dirty="0"/>
+          </a:p>
+        </p:txBody>
+      </p:sp>
+      <p:sp>
+        <p:nvSpPr>
+          <p:cNvPr id="4" name="Content Placeholder 3"/>
+          <p:cNvSpPr>
+            <a:spLocks noGrp="1"/>
+          </p:cNvSpPr>
+          <p:nvPr>
+            <p:ph sz="half" idx="2"/>
+          </p:nvPr>
+        </p:nvSpPr>
+        <p:spPr>
+          <a:xfrm>
+            <a:off x="6525403" y="2285999"/>
+            <a:ext cx="4447786" cy="3581401"/>
+          </a:xfrm>
+        </p:spPr>
+        <p:txBody>
+          <a:bodyPr/>
+          <a:lstStyle>
+            <a:lvl1pPr>
+              <a:defRPr>
+                <a:solidFill>
+                  <a:schemeClr val="tx2"/>
+                </a:solidFill>
+              </a:defRPr>
+            </a:lvl1pPr>
+            <a:lvl2pPr>
+              <a:defRPr>
+                <a:solidFill>
+                  <a:schemeClr val="tx2"/>
+                </a:solidFill>
+              </a:defRPr>
+            </a:lvl2pPr>
+            <a:lvl3pPr>
+              <a:defRPr>
+                <a:solidFill>
+                  <a:schemeClr val="tx2"/>
+                </a:solidFill>
+              </a:defRPr>
+            </a:lvl3pPr>
+            <a:lvl4pPr>
+              <a:defRPr>
+                <a:solidFill>
+                  <a:schemeClr val="tx2"/>
+                </a:solidFill>
+              </a:defRPr>
+            </a:lvl4pPr>
+            <a:lvl5pPr>
+              <a:defRPr>
+                <a:solidFill>
+                  <a:schemeClr val="tx2"/>
+                </a:solidFill>
+              </a:defRPr>
+            </a:lvl5pPr>
+          </a:lstStyle>
+          <a:p>
+            <a:pPr lvl="0"/>
+            <a:r>
+              <a:rPr lang="en-US" smtClean="0"/>
+              <a:t>Click to edit Master text styles</a:t>
+            </a:r>
+          </a:p>
+          <a:p>
+            <a:pPr lvl="1"/>
+            <a:r>
+              <a:rPr lang="en-US" smtClean="0"/>
+              <a:t>Second level</a:t>
+            </a:r>
+          </a:p>
+          <a:p>
+            <a:pPr lvl="2"/>
+            <a:r>
+              <a:rPr lang="en-US" smtClean="0"/>
+              <a:t>Third level</a:t>
+            </a:r>
+          </a:p>
+          <a:p>
+            <a:pPr lvl="3"/>
+            <a:r>
+              <a:rPr lang="en-US" smtClean="0"/>
+              <a:t>Fourth level</a:t>
+            </a:r>
+          </a:p>
+          <a:p>
+            <a:pPr lvl="4"/>
+            <a:r>
+              <a:rPr lang="en-US" smtClean="0"/>
+              <a:t>Fifth level</a:t>
+            </a:r>
+            <a:endParaRPr lang="en-US" dirty="0"/>
+          </a:p>
+        </p:txBody>
+      </p:sp>
+      <p:sp>
+        <p:nvSpPr>
+          <p:cNvPr id="5" name="Date Placeholder 4"/>
+          <p:cNvSpPr>
+            <a:spLocks noGrp="1"/>
+          </p:cNvSpPr>
+          <p:nvPr>
+            <p:ph type="dt" sz="half" idx="10"/>
+          </p:nvPr>
+        </p:nvSpPr>
+        <p:spPr/>
         <p:txBody>
           <a:bodyPr/>
           <a:lstStyle/>
           <a:p>
-            <a:pPr lvl="0"/>
-            <a:r>
-              <a:rPr lang="en-US" smtClean="0"/>
-              <a:t>Click to edit Master text styles</a:t>
-            </a:r>
-          </a:p>
-          <a:p>
-            <a:pPr lvl="1"/>
-            <a:r>
-              <a:rPr lang="en-US" smtClean="0"/>
-              <a:t>Second level</a:t>
-            </a:r>
-          </a:p>
-          <a:p>
-            <a:pPr lvl="2"/>
-            <a:r>
-              <a:rPr lang="en-US" smtClean="0"/>
-              <a:t>Third level</a:t>
-            </a:r>
-          </a:p>
-          <a:p>
-            <a:pPr lvl="3"/>
-            <a:r>
-              <a:rPr lang="en-US" smtClean="0"/>
-              <a:t>Fourth level</a:t>
-            </a:r>
-          </a:p>
-          <a:p>
-            <a:pPr lvl="4"/>
-            <a:r>
-              <a:rPr lang="en-US" smtClean="0"/>
-              <a:t>Fifth level</a:t>
-            </a:r>
-            <a:endParaRPr lang="en-US"/>
-          </a:p>
-        </p:txBody>
-      </p:sp>
-      <p:sp>
-        <p:nvSpPr>
-          <p:cNvPr id="4" name="Content Placeholder 3"/>
-          <p:cNvSpPr>
-            <a:spLocks noGrp="1"/>
-          </p:cNvSpPr>
-          <p:nvPr>
-            <p:ph sz="half" idx="2"/>
-          </p:nvPr>
-        </p:nvSpPr>
-        <p:spPr>
-          <a:xfrm>
-            <a:off x="6172200" y="1825625"/>
-            <a:ext cx="5181600" cy="4351338"/>
-          </a:xfrm>
-        </p:spPr>
-        <p:txBody>
-          <a:bodyPr/>
-          <a:lstStyle/>
-          <a:p>
-            <a:pPr lvl="0"/>
-            <a:r>
-              <a:rPr lang="en-US" smtClean="0"/>
-              <a:t>Click to edit Master text styles</a:t>
-            </a:r>
-          </a:p>
-          <a:p>
-            <a:pPr lvl="1"/>
-            <a:r>
-              <a:rPr lang="en-US" smtClean="0"/>
-              <a:t>Second level</a:t>
-            </a:r>
-          </a:p>
-          <a:p>
-            <a:pPr lvl="2"/>
-            <a:r>
-              <a:rPr lang="en-US" smtClean="0"/>
-              <a:t>Third level</a:t>
-            </a:r>
-          </a:p>
-          <a:p>
-            <a:pPr lvl="3"/>
-            <a:r>
-              <a:rPr lang="en-US" smtClean="0"/>
-              <a:t>Fourth level</a:t>
-            </a:r>
-          </a:p>
-          <a:p>
-            <a:pPr lvl="4"/>
-            <a:r>
-              <a:rPr lang="en-US" smtClean="0"/>
-              <a:t>Fifth level</a:t>
-            </a:r>
-            <a:endParaRPr lang="en-US"/>
-          </a:p>
-        </p:txBody>
-      </p:sp>
-      <p:sp>
-        <p:nvSpPr>
-          <p:cNvPr id="5" name="Date Placeholder 4"/>
-          <p:cNvSpPr>
-            <a:spLocks noGrp="1"/>
-          </p:cNvSpPr>
-          <p:nvPr>
-            <p:ph type="dt" sz="half" idx="10"/>
-          </p:nvPr>
-        </p:nvSpPr>
-        <p:spPr/>
-        <p:txBody>
-          <a:bodyPr/>
-          <a:lstStyle/>
-          <a:p>
             <a:fld id="{63103B83-DECA-9D4F-ADBD-5F3BB2ACF0D5}" type="datetimeFigureOut">
               <a:rPr lang="en-US" smtClean="0"/>
-              <a:t>3/18/17</a:t>
+              <a:t>3/19/17</a:t>
             </a:fld>
             <a:endParaRPr lang="en-US"/>
           </a:p>
@@ -1621,6 +2051,11 @@
         </p:txBody>
       </p:sp>
     </p:spTree>
+    <p:extLst>
+      <p:ext uri="{BB962C8B-B14F-4D97-AF65-F5344CB8AC3E}">
+        <p14:creationId xmlns:p14="http://schemas.microsoft.com/office/powerpoint/2010/main" val="1045381248"/>
+      </p:ext>
+    </p:extLst>
   </p:cSld>
   <p:clrMapOvr>
     <a:masterClrMapping/>
@@ -1657,19 +2092,27 @@
         </p:nvSpPr>
         <p:spPr>
           <a:xfrm>
-            <a:off x="839788" y="365125"/>
-            <a:ext cx="10515600" cy="1325563"/>
+            <a:off x="1371600" y="685800"/>
+            <a:ext cx="9601200" cy="1485900"/>
           </a:xfrm>
         </p:spPr>
         <p:txBody>
           <a:bodyPr/>
-          <a:lstStyle/>
+          <a:lstStyle>
+            <a:lvl1pPr>
+              <a:defRPr>
+                <a:solidFill>
+                  <a:schemeClr val="tx2"/>
+                </a:solidFill>
+              </a:defRPr>
+            </a:lvl1pPr>
+          </a:lstStyle>
           <a:p>
             <a:r>
               <a:rPr lang="en-US" smtClean="0"/>
               <a:t>Click to edit Master title style</a:t>
             </a:r>
-            <a:endParaRPr lang="en-US"/>
+            <a:endParaRPr lang="en-US" dirty="0"/>
           </a:p>
         </p:txBody>
       </p:sp>
@@ -1685,16 +2128,31 @@
         </p:nvSpPr>
         <p:spPr>
           <a:xfrm>
-            <a:off x="839788" y="1681163"/>
-            <a:ext cx="5157787" cy="823912"/>
-          </a:xfrm>
-        </p:spPr>
-        <p:txBody>
-          <a:bodyPr anchor="b"/>
+            <a:off x="1371600" y="2340864"/>
+            <a:ext cx="4443984" cy="823912"/>
+          </a:xfrm>
+        </p:spPr>
+        <p:txBody>
+          <a:bodyPr anchor="b">
+            <a:noAutofit/>
+          </a:bodyPr>
           <a:lstStyle>
             <a:lvl1pPr marL="0" indent="0">
-              <a:buNone/>
-              <a:defRPr sz="2400" b="1"/>
+              <a:lnSpc>
+                <a:spcPct val="84000"/>
+              </a:lnSpc>
+              <a:spcBef>
+                <a:spcPts val="0"/>
+              </a:spcBef>
+              <a:spcAft>
+                <a:spcPts val="0"/>
+              </a:spcAft>
+              <a:buNone/>
+              <a:defRPr sz="3000" b="0" baseline="0">
+                <a:solidFill>
+                  <a:schemeClr val="tx2"/>
+                </a:solidFill>
+              </a:defRPr>
             </a:lvl1pPr>
             <a:lvl2pPr marL="457200" indent="0">
               <a:buNone/>
@@ -1750,13 +2208,49 @@
         </p:nvSpPr>
         <p:spPr>
           <a:xfrm>
-            <a:off x="839788" y="2505075"/>
-            <a:ext cx="5157787" cy="3684588"/>
+            <a:off x="1371600" y="3305207"/>
+            <a:ext cx="4443984" cy="2562193"/>
           </a:xfrm>
         </p:spPr>
         <p:txBody>
           <a:bodyPr/>
-          <a:lstStyle/>
+          <a:lstStyle>
+            <a:lvl1pPr>
+              <a:defRPr baseline="0">
+                <a:solidFill>
+                  <a:schemeClr val="tx2"/>
+                </a:solidFill>
+              </a:defRPr>
+            </a:lvl1pPr>
+            <a:lvl2pPr>
+              <a:defRPr baseline="0">
+                <a:solidFill>
+                  <a:schemeClr val="tx2"/>
+                </a:solidFill>
+              </a:defRPr>
+            </a:lvl2pPr>
+            <a:lvl3pPr>
+              <a:defRPr baseline="0">
+                <a:solidFill>
+                  <a:schemeClr val="tx2"/>
+                </a:solidFill>
+              </a:defRPr>
+            </a:lvl3pPr>
+            <a:lvl4pPr>
+              <a:defRPr baseline="0">
+                <a:solidFill>
+                  <a:schemeClr val="tx2"/>
+                </a:solidFill>
+              </a:defRPr>
+            </a:lvl4pPr>
+            <a:lvl5pPr>
+              <a:defRPr baseline="0">
+                <a:solidFill>
+                  <a:schemeClr val="tx2"/>
+                </a:solidFill>
+              </a:defRPr>
+            </a:lvl5pPr>
+          </a:lstStyle>
           <a:p>
             <a:pPr lvl="0"/>
             <a:r>
@@ -1791,7 +2285,7 @@
               <a:rPr lang="en-US" smtClean="0"/>
               <a:t>Fifth level</a:t>
             </a:r>
-            <a:endParaRPr lang="en-US"/>
+            <a:endParaRPr lang="en-US" dirty="0"/>
           </a:p>
         </p:txBody>
       </p:sp>
@@ -1807,16 +2301,31 @@
         </p:nvSpPr>
         <p:spPr>
           <a:xfrm>
-            <a:off x="6172200" y="1681163"/>
-            <a:ext cx="5183188" cy="823912"/>
-          </a:xfrm>
-        </p:spPr>
-        <p:txBody>
-          <a:bodyPr anchor="b"/>
+            <a:off x="6525014" y="2340864"/>
+            <a:ext cx="4443984" cy="823912"/>
+          </a:xfrm>
+        </p:spPr>
+        <p:txBody>
+          <a:bodyPr anchor="b">
+            <a:noAutofit/>
+          </a:bodyPr>
           <a:lstStyle>
             <a:lvl1pPr marL="0" indent="0">
-              <a:buNone/>
-              <a:defRPr sz="2400" b="1"/>
+              <a:lnSpc>
+                <a:spcPct val="84000"/>
+              </a:lnSpc>
+              <a:spcBef>
+                <a:spcPts val="0"/>
+              </a:spcBef>
+              <a:spcAft>
+                <a:spcPts val="0"/>
+              </a:spcAft>
+              <a:buNone/>
+              <a:defRPr sz="3000" b="0" baseline="0">
+                <a:solidFill>
+                  <a:schemeClr val="tx2"/>
+                </a:solidFill>
+              </a:defRPr>
             </a:lvl1pPr>
             <a:lvl2pPr marL="457200" indent="0">
               <a:buNone/>
@@ -1872,69 +2381,105 @@
         </p:nvSpPr>
         <p:spPr>
           <a:xfrm>
-            <a:off x="6172200" y="2505075"/>
-            <a:ext cx="5183188" cy="3684588"/>
-          </a:xfrm>
-        </p:spPr>
+            <a:off x="6525014" y="3305207"/>
+            <a:ext cx="4443984" cy="2562193"/>
+          </a:xfrm>
+        </p:spPr>
+        <p:txBody>
+          <a:bodyPr/>
+          <a:lstStyle>
+            <a:lvl1pPr>
+              <a:defRPr baseline="0">
+                <a:solidFill>
+                  <a:schemeClr val="tx2"/>
+                </a:solidFill>
+              </a:defRPr>
+            </a:lvl1pPr>
+            <a:lvl2pPr>
+              <a:defRPr baseline="0">
+                <a:solidFill>
+                  <a:schemeClr val="tx2"/>
+                </a:solidFill>
+              </a:defRPr>
+            </a:lvl2pPr>
+            <a:lvl3pPr>
+              <a:defRPr baseline="0">
+                <a:solidFill>
+                  <a:schemeClr val="tx2"/>
+                </a:solidFill>
+              </a:defRPr>
+            </a:lvl3pPr>
+            <a:lvl4pPr>
+              <a:defRPr baseline="0">
+                <a:solidFill>
+                  <a:schemeClr val="tx2"/>
+                </a:solidFill>
+              </a:defRPr>
+            </a:lvl4pPr>
+            <a:lvl5pPr>
+              <a:defRPr baseline="0">
+                <a:solidFill>
+                  <a:schemeClr val="tx2"/>
+                </a:solidFill>
+              </a:defRPr>
+            </a:lvl5pPr>
+          </a:lstStyle>
+          <a:p>
+            <a:pPr lvl="0"/>
+            <a:r>
+              <a:rPr lang="en-US" smtClean="0"/>
+              <a:t>Click to edit Master text styles</a:t>
+            </a:r>
+          </a:p>
+          <a:p>
+            <a:pPr lvl="1"/>
+            <a:r>
+              <a:rPr lang="en-US" smtClean="0"/>
+              <a:t>Second level</a:t>
+            </a:r>
+          </a:p>
+          <a:p>
+            <a:pPr lvl="2"/>
+            <a:r>
+              <a:rPr lang="en-US" smtClean="0"/>
+              <a:t>Third level</a:t>
+            </a:r>
+          </a:p>
+          <a:p>
+            <a:pPr lvl="3"/>
+            <a:r>
+              <a:rPr lang="en-US" smtClean="0"/>
+              <a:t>Fourth level</a:t>
+            </a:r>
+          </a:p>
+          <a:p>
+            <a:pPr lvl="4"/>
+            <a:r>
+              <a:rPr lang="en-US" smtClean="0"/>
+              <a:t>Fifth level</a:t>
+            </a:r>
+            <a:endParaRPr lang="en-US" dirty="0"/>
+          </a:p>
+        </p:txBody>
+      </p:sp>
+      <p:sp>
+        <p:nvSpPr>
+          <p:cNvPr id="7" name="Date Placeholder 6"/>
+          <p:cNvSpPr>
+            <a:spLocks noGrp="1"/>
+          </p:cNvSpPr>
+          <p:nvPr>
+            <p:ph type="dt" sz="half" idx="10"/>
+          </p:nvPr>
+        </p:nvSpPr>
+        <p:spPr/>
         <p:txBody>
           <a:bodyPr/>
           <a:lstStyle/>
           <a:p>
-            <a:pPr lvl="0"/>
-            <a:r>
-              <a:rPr lang="en-US" smtClean="0"/>
-              <a:t>Click to edit Master text styles</a:t>
-            </a:r>
-          </a:p>
-          <a:p>
-            <a:pPr lvl="1"/>
-            <a:r>
-              <a:rPr lang="en-US" smtClean="0"/>
-              <a:t>Second level</a:t>
-            </a:r>
-          </a:p>
-          <a:p>
-            <a:pPr lvl="2"/>
-            <a:r>
-              <a:rPr lang="en-US" smtClean="0"/>
-              <a:t>Third level</a:t>
-            </a:r>
-          </a:p>
-          <a:p>
-            <a:pPr lvl="3"/>
-            <a:r>
-              <a:rPr lang="en-US" smtClean="0"/>
-              <a:t>Fourth level</a:t>
-            </a:r>
-          </a:p>
-          <a:p>
-            <a:pPr lvl="4"/>
-            <a:r>
-              <a:rPr lang="en-US" smtClean="0"/>
-              <a:t>Fifth level</a:t>
-            </a:r>
-            <a:endParaRPr lang="en-US"/>
-          </a:p>
-        </p:txBody>
-      </p:sp>
-      <p:sp>
-        <p:nvSpPr>
-          <p:cNvPr id="7" name="Date Placeholder 6"/>
-          <p:cNvSpPr>
-            <a:spLocks noGrp="1"/>
-          </p:cNvSpPr>
-          <p:nvPr>
-            <p:ph type="dt" sz="half" idx="10"/>
-          </p:nvPr>
-        </p:nvSpPr>
-        <p:spPr/>
-        <p:txBody>
-          <a:bodyPr/>
-          <a:lstStyle/>
-          <a:p>
             <a:fld id="{63103B83-DECA-9D4F-ADBD-5F3BB2ACF0D5}" type="datetimeFigureOut">
               <a:rPr lang="en-US" smtClean="0"/>
-              <a:t>3/18/17</a:t>
+              <a:t>3/19/17</a:t>
             </a:fld>
             <a:endParaRPr lang="en-US"/>
           </a:p>
@@ -1983,6 +2528,11 @@
         </p:txBody>
       </p:sp>
     </p:spTree>
+    <p:extLst>
+      <p:ext uri="{BB962C8B-B14F-4D97-AF65-F5344CB8AC3E}">
+        <p14:creationId xmlns:p14="http://schemas.microsoft.com/office/powerpoint/2010/main" val="1158919029"/>
+      </p:ext>
+    </p:extLst>
   </p:cSld>
   <p:clrMapOvr>
     <a:masterClrMapping/>
@@ -2026,7 +2576,7 @@
               <a:rPr lang="en-US" smtClean="0"/>
               <a:t>Click to edit Master title style</a:t>
             </a:r>
-            <a:endParaRPr lang="en-US"/>
+            <a:endParaRPr lang="en-US" dirty="0"/>
           </a:p>
         </p:txBody>
       </p:sp>
@@ -2047,7 +2597,7 @@
           <a:p>
             <a:fld id="{63103B83-DECA-9D4F-ADBD-5F3BB2ACF0D5}" type="datetimeFigureOut">
               <a:rPr lang="en-US" smtClean="0"/>
-              <a:t>3/18/17</a:t>
+              <a:t>3/19/17</a:t>
             </a:fld>
             <a:endParaRPr lang="en-US"/>
           </a:p>
@@ -2096,6 +2646,11 @@
         </p:txBody>
       </p:sp>
     </p:spTree>
+    <p:extLst>
+      <p:ext uri="{BB962C8B-B14F-4D97-AF65-F5344CB8AC3E}">
+        <p14:creationId xmlns:p14="http://schemas.microsoft.com/office/powerpoint/2010/main" val="275442113"/>
+      </p:ext>
+    </p:extLst>
   </p:cSld>
   <p:clrMapOvr>
     <a:masterClrMapping/>
@@ -2137,7 +2692,7 @@
           <a:p>
             <a:fld id="{63103B83-DECA-9D4F-ADBD-5F3BB2ACF0D5}" type="datetimeFigureOut">
               <a:rPr lang="en-US" smtClean="0"/>
-              <a:t>3/18/17</a:t>
+              <a:t>3/19/17</a:t>
             </a:fld>
             <a:endParaRPr lang="en-US"/>
           </a:p>
@@ -2186,15 +2741,25 @@
         </p:txBody>
       </p:sp>
     </p:spTree>
+    <p:extLst>
+      <p:ext uri="{BB962C8B-B14F-4D97-AF65-F5344CB8AC3E}">
+        <p14:creationId xmlns:p14="http://schemas.microsoft.com/office/powerpoint/2010/main" val="1528333906"/>
+      </p:ext>
+    </p:extLst>
   </p:cSld>
   <p:clrMapOvr>
     <a:masterClrMapping/>
   </p:clrMapOvr>
+  <p:extLst>
+    <p:ext uri="{DCECCB84-F9BA-43D5-87BE-67443E8EF086}">
+      <p15:sldGuideLst xmlns:p15="http://schemas.microsoft.com/office/powerpoint/2012/main"/>
+    </p:ext>
+  </p:extLst>
 </p:sldLayout>
 </file>
 
 <file path=ppt/slideLayouts/slideLayout8.xml><?xml version="1.0" encoding="utf-8"?>
-<p:sldLayout xmlns:a="http://schemas.openxmlformats.org/drawingml/2006/main" xmlns:r="http://schemas.openxmlformats.org/officeDocument/2006/relationships" xmlns:p="http://schemas.openxmlformats.org/presentationml/2006/main" type="objTx" preserve="1">
+<p:sldLayout xmlns:a="http://schemas.openxmlformats.org/drawingml/2006/main" xmlns:r="http://schemas.openxmlformats.org/officeDocument/2006/relationships" xmlns:p="http://schemas.openxmlformats.org/presentationml/2006/main" showMasterSp="0" type="objTx" preserve="1">
   <p:cSld name="Content with Caption">
     <p:spTree>
       <p:nvGrpSpPr>
@@ -2212,6 +2777,44 @@
       </p:grpSpPr>
       <p:sp>
         <p:nvSpPr>
+          <p:cNvPr id="8" name="Rectangle 7" title="Background Shape"/>
+          <p:cNvSpPr/>
+          <p:nvPr/>
+        </p:nvSpPr>
+        <p:spPr>
+          <a:xfrm>
+            <a:off x="0" y="376"/>
+            <a:ext cx="5303520" cy="6857624"/>
+          </a:xfrm>
+          <a:prstGeom prst="rect">
+            <a:avLst/>
+          </a:prstGeom>
+          <a:solidFill>
+            <a:schemeClr val="accent1"/>
+          </a:solidFill>
+          <a:ln>
+            <a:noFill/>
+          </a:ln>
+        </p:spPr>
+        <p:style>
+          <a:lnRef idx="2">
+            <a:schemeClr val="accent1">
+              <a:shade val="50000"/>
+            </a:schemeClr>
+          </a:lnRef>
+          <a:fillRef idx="1">
+            <a:schemeClr val="accent1"/>
+          </a:fillRef>
+          <a:effectRef idx="0">
+            <a:schemeClr val="accent1"/>
+          </a:effectRef>
+          <a:fontRef idx="minor">
+            <a:schemeClr val="lt1"/>
+          </a:fontRef>
+        </p:style>
+      </p:sp>
+      <p:sp>
+        <p:nvSpPr>
           <p:cNvPr id="2" name="Title 1"/>
           <p:cNvSpPr>
             <a:spLocks noGrp="1"/>
@@ -2222,15 +2825,24 @@
         </p:nvSpPr>
         <p:spPr>
           <a:xfrm>
-            <a:off x="839788" y="457200"/>
-            <a:ext cx="3932237" cy="1600200"/>
-          </a:xfrm>
-        </p:spPr>
-        <p:txBody>
-          <a:bodyPr anchor="b"/>
+            <a:off x="723900" y="685800"/>
+            <a:ext cx="3855720" cy="2157884"/>
+          </a:xfrm>
+        </p:spPr>
+        <p:txBody>
+          <a:bodyPr anchor="t">
+            <a:noAutofit/>
+          </a:bodyPr>
           <a:lstStyle>
             <a:lvl1pPr>
-              <a:defRPr sz="3200"/>
+              <a:lnSpc>
+                <a:spcPct val="84000"/>
+              </a:lnSpc>
+              <a:defRPr sz="4800" baseline="0">
+                <a:solidFill>
+                  <a:schemeClr val="tx2"/>
+                </a:solidFill>
+              </a:defRPr>
             </a:lvl1pPr>
           </a:lstStyle>
           <a:p>
@@ -2238,7 +2850,7 @@
               <a:rPr lang="en-US" smtClean="0"/>
               <a:t>Click to edit Master title style</a:t>
             </a:r>
-            <a:endParaRPr lang="en-US"/>
+            <a:endParaRPr lang="en-US" dirty="0"/>
           </a:p>
         </p:txBody>
       </p:sp>
@@ -2254,39 +2866,39 @@
         </p:nvSpPr>
         <p:spPr>
           <a:xfrm>
-            <a:off x="5183188" y="987425"/>
-            <a:ext cx="6172200" cy="4873625"/>
+            <a:off x="6256020" y="685801"/>
+            <a:ext cx="5212080" cy="5175250"/>
           </a:xfrm>
         </p:spPr>
         <p:txBody>
           <a:bodyPr/>
           <a:lstStyle>
             <a:lvl1pPr>
-              <a:defRPr sz="3200"/>
+              <a:defRPr sz="2000"/>
             </a:lvl1pPr>
             <a:lvl2pPr>
-              <a:defRPr sz="2800"/>
+              <a:defRPr sz="2000"/>
             </a:lvl2pPr>
             <a:lvl3pPr>
-              <a:defRPr sz="2400"/>
+              <a:defRPr sz="1800"/>
             </a:lvl3pPr>
             <a:lvl4pPr>
-              <a:defRPr sz="2000"/>
+              <a:defRPr sz="1800"/>
             </a:lvl4pPr>
             <a:lvl5pPr>
-              <a:defRPr sz="2000"/>
+              <a:defRPr sz="1600"/>
             </a:lvl5pPr>
             <a:lvl6pPr>
-              <a:defRPr sz="2000"/>
+              <a:defRPr sz="1600"/>
             </a:lvl6pPr>
             <a:lvl7pPr>
-              <a:defRPr sz="2000"/>
+              <a:defRPr sz="1600"/>
             </a:lvl7pPr>
             <a:lvl8pPr>
-              <a:defRPr sz="2000"/>
+              <a:defRPr sz="1600"/>
             </a:lvl8pPr>
             <a:lvl9pPr>
-              <a:defRPr sz="2000"/>
+              <a:defRPr sz="1600"/>
             </a:lvl9pPr>
           </a:lstStyle>
           <a:p>
@@ -2323,7 +2935,7 @@
               <a:rPr lang="en-US" smtClean="0"/>
               <a:t>Fifth level</a:t>
             </a:r>
-            <a:endParaRPr lang="en-US"/>
+            <a:endParaRPr lang="en-US" dirty="0"/>
           </a:p>
         </p:txBody>
       </p:sp>
@@ -2339,14 +2951,23 @@
         </p:nvSpPr>
         <p:spPr>
           <a:xfrm>
-            <a:off x="839788" y="2057400"/>
-            <a:ext cx="3932237" cy="3811588"/>
+            <a:off x="723900" y="2856344"/>
+            <a:ext cx="3855720" cy="3011056"/>
           </a:xfrm>
         </p:spPr>
         <p:txBody>
           <a:bodyPr/>
           <a:lstStyle>
             <a:lvl1pPr marL="0" indent="0">
+              <a:lnSpc>
+                <a:spcPct val="113000"/>
+              </a:lnSpc>
+              <a:spcBef>
+                <a:spcPts val="0"/>
+              </a:spcBef>
+              <a:spcAft>
+                <a:spcPts val="1500"/>
+              </a:spcAft>
               <a:buNone/>
               <a:defRPr sz="1600"/>
             </a:lvl1pPr>
@@ -2402,14 +3023,27 @@
             <p:ph type="dt" sz="half" idx="10"/>
           </p:nvPr>
         </p:nvSpPr>
-        <p:spPr/>
+        <p:spPr>
+          <a:xfrm>
+            <a:off x="723900" y="6453386"/>
+            <a:ext cx="1204572" cy="404614"/>
+          </a:xfrm>
+        </p:spPr>
         <p:txBody>
           <a:bodyPr/>
-          <a:lstStyle/>
+          <a:lstStyle>
+            <a:lvl1pPr>
+              <a:defRPr>
+                <a:solidFill>
+                  <a:schemeClr val="tx2"/>
+                </a:solidFill>
+              </a:defRPr>
+            </a:lvl1pPr>
+          </a:lstStyle>
           <a:p>
             <a:fld id="{63103B83-DECA-9D4F-ADBD-5F3BB2ACF0D5}" type="datetimeFigureOut">
               <a:rPr lang="en-US" smtClean="0"/>
-              <a:t>3/18/17</a:t>
+              <a:t>3/19/17</a:t>
             </a:fld>
             <a:endParaRPr lang="en-US"/>
           </a:p>
@@ -2425,10 +3059,23 @@
             <p:ph type="ftr" sz="quarter" idx="11"/>
           </p:nvPr>
         </p:nvSpPr>
-        <p:spPr/>
+        <p:spPr>
+          <a:xfrm>
+            <a:off x="2205945" y="6453386"/>
+            <a:ext cx="2373675" cy="404614"/>
+          </a:xfrm>
+        </p:spPr>
         <p:txBody>
           <a:bodyPr/>
-          <a:lstStyle/>
+          <a:lstStyle>
+            <a:lvl1pPr>
+              <a:defRPr>
+                <a:solidFill>
+                  <a:schemeClr val="tx2"/>
+                </a:solidFill>
+              </a:defRPr>
+            </a:lvl1pPr>
+          </a:lstStyle>
           <a:p>
             <a:endParaRPr lang="en-US"/>
           </a:p>
@@ -2444,10 +3091,23 @@
             <p:ph type="sldNum" sz="quarter" idx="12"/>
           </p:nvPr>
         </p:nvSpPr>
-        <p:spPr/>
+        <p:spPr>
+          <a:xfrm>
+            <a:off x="9883140" y="6453386"/>
+            <a:ext cx="1596292" cy="404614"/>
+          </a:xfrm>
+        </p:spPr>
         <p:txBody>
           <a:bodyPr/>
-          <a:lstStyle/>
+          <a:lstStyle>
+            <a:lvl1pPr>
+              <a:defRPr>
+                <a:solidFill>
+                  <a:schemeClr val="tx2"/>
+                </a:solidFill>
+              </a:defRPr>
+            </a:lvl1pPr>
+          </a:lstStyle>
           <a:p>
             <a:fld id="{F34B119F-5F17-E748-9E84-C55301851A38}" type="slidenum">
               <a:rPr lang="en-US" smtClean="0"/>
@@ -2457,16 +3117,64 @@
           </a:p>
         </p:txBody>
       </p:sp>
+      <p:sp>
+        <p:nvSpPr>
+          <p:cNvPr id="9" name="Rectangle 8" title="Divider Bar"/>
+          <p:cNvSpPr/>
+          <p:nvPr/>
+        </p:nvSpPr>
+        <p:spPr>
+          <a:xfrm>
+            <a:off x="5303520" y="376"/>
+            <a:ext cx="228600" cy="6858000"/>
+          </a:xfrm>
+          <a:prstGeom prst="rect">
+            <a:avLst/>
+          </a:prstGeom>
+          <a:solidFill>
+            <a:schemeClr val="tx2"/>
+          </a:solidFill>
+          <a:ln>
+            <a:noFill/>
+          </a:ln>
+        </p:spPr>
+        <p:style>
+          <a:lnRef idx="2">
+            <a:schemeClr val="accent1">
+              <a:shade val="50000"/>
+            </a:schemeClr>
+          </a:lnRef>
+          <a:fillRef idx="1">
+            <a:schemeClr val="accent1"/>
+          </a:fillRef>
+          <a:effectRef idx="0">
+            <a:schemeClr val="accent1"/>
+          </a:effectRef>
+          <a:fontRef idx="minor">
+            <a:schemeClr val="lt1"/>
+          </a:fontRef>
+        </p:style>
+      </p:sp>
     </p:spTree>
+    <p:extLst>
+      <p:ext uri="{BB962C8B-B14F-4D97-AF65-F5344CB8AC3E}">
+        <p14:creationId xmlns:p14="http://schemas.microsoft.com/office/powerpoint/2010/main" val="656056375"/>
+      </p:ext>
+    </p:extLst>
   </p:cSld>
   <p:clrMapOvr>
     <a:masterClrMapping/>
   </p:clrMapOvr>
+  <p:extLst>
+    <p:ext uri="{DCECCB84-F9BA-43D5-87BE-67443E8EF086}">
+      <p15:sldGuideLst xmlns:p15="http://schemas.microsoft.com/office/powerpoint/2012/main"/>
+    </p:ext>
+  </p:extLst>
 </p:sldLayout>
 </file>
 
 <file path=ppt/slideLayouts/slideLayout9.xml><?xml version="1.0" encoding="utf-8"?>
-<p:sldLayout xmlns:a="http://schemas.openxmlformats.org/drawingml/2006/main" xmlns:r="http://schemas.openxmlformats.org/officeDocument/2006/relationships" xmlns:p="http://schemas.openxmlformats.org/presentationml/2006/main" type="picTx" preserve="1">
+<p:sldLayout xmlns:a="http://schemas.openxmlformats.org/drawingml/2006/main" xmlns:r="http://schemas.openxmlformats.org/officeDocument/2006/relationships" xmlns:p="http://schemas.openxmlformats.org/presentationml/2006/main" showMasterSp="0" type="picTx" preserve="1">
   <p:cSld name="Picture with Caption">
     <p:spTree>
       <p:nvGrpSpPr>
@@ -2484,6 +3192,44 @@
       </p:grpSpPr>
       <p:sp>
         <p:nvSpPr>
+          <p:cNvPr id="8" name="Rectangle 7" title="Background Shape"/>
+          <p:cNvSpPr/>
+          <p:nvPr/>
+        </p:nvSpPr>
+        <p:spPr>
+          <a:xfrm>
+            <a:off x="0" y="376"/>
+            <a:ext cx="5303520" cy="6857624"/>
+          </a:xfrm>
+          <a:prstGeom prst="rect">
+            <a:avLst/>
+          </a:prstGeom>
+          <a:solidFill>
+            <a:schemeClr val="accent1"/>
+          </a:solidFill>
+          <a:ln>
+            <a:noFill/>
+          </a:ln>
+        </p:spPr>
+        <p:style>
+          <a:lnRef idx="2">
+            <a:schemeClr val="accent1">
+              <a:shade val="50000"/>
+            </a:schemeClr>
+          </a:lnRef>
+          <a:fillRef idx="1">
+            <a:schemeClr val="accent1"/>
+          </a:fillRef>
+          <a:effectRef idx="0">
+            <a:schemeClr val="accent1"/>
+          </a:effectRef>
+          <a:fontRef idx="minor">
+            <a:schemeClr val="lt1"/>
+          </a:fontRef>
+        </p:style>
+      </p:sp>
+      <p:sp>
+        <p:nvSpPr>
           <p:cNvPr id="2" name="Title 1"/>
           <p:cNvSpPr>
             <a:spLocks noGrp="1"/>
@@ -2494,15 +3240,20 @@
         </p:nvSpPr>
         <p:spPr>
           <a:xfrm>
-            <a:off x="839788" y="457200"/>
-            <a:ext cx="3932237" cy="1600200"/>
-          </a:xfrm>
-        </p:spPr>
-        <p:txBody>
-          <a:bodyPr anchor="b"/>
+            <a:off x="723900" y="685800"/>
+            <a:ext cx="3855720" cy="2157884"/>
+          </a:xfrm>
+        </p:spPr>
+        <p:txBody>
+          <a:bodyPr anchor="t">
+            <a:normAutofit/>
+          </a:bodyPr>
           <a:lstStyle>
             <a:lvl1pPr>
-              <a:defRPr sz="3200"/>
+              <a:lnSpc>
+                <a:spcPct val="84000"/>
+              </a:lnSpc>
+              <a:defRPr sz="4800" baseline="0"/>
             </a:lvl1pPr>
           </a:lstStyle>
           <a:p>
@@ -2510,7 +3261,7 @@
               <a:rPr lang="en-US" smtClean="0"/>
               <a:t>Click to edit Master title style</a:t>
             </a:r>
-            <a:endParaRPr lang="en-US"/>
+            <a:endParaRPr lang="en-US" dirty="0"/>
           </a:p>
         </p:txBody>
       </p:sp>
@@ -2518,7 +3269,7 @@
         <p:nvSpPr>
           <p:cNvPr id="3" name="Picture Placeholder 2"/>
           <p:cNvSpPr>
-            <a:spLocks noGrp="1"/>
+            <a:spLocks noGrp="1" noChangeAspect="1"/>
           </p:cNvSpPr>
           <p:nvPr>
             <p:ph type="pic" idx="1"/>
@@ -2526,75 +3277,90 @@
         </p:nvSpPr>
         <p:spPr>
           <a:xfrm>
-            <a:off x="5183188" y="987425"/>
-            <a:ext cx="6172200" cy="4873625"/>
+            <a:off x="5532120" y="0"/>
+            <a:ext cx="6659880" cy="6857999"/>
+          </a:xfrm>
+        </p:spPr>
+        <p:txBody>
+          <a:bodyPr anchor="t">
+            <a:normAutofit/>
+          </a:bodyPr>
+          <a:lstStyle>
+            <a:lvl1pPr marL="0" indent="0">
+              <a:buNone/>
+              <a:defRPr sz="2000"/>
+            </a:lvl1pPr>
+            <a:lvl2pPr marL="457200" indent="0">
+              <a:buNone/>
+              <a:defRPr sz="2000"/>
+            </a:lvl2pPr>
+            <a:lvl3pPr marL="914400" indent="0">
+              <a:buNone/>
+              <a:defRPr sz="2000"/>
+            </a:lvl3pPr>
+            <a:lvl4pPr marL="1371600" indent="0">
+              <a:buNone/>
+              <a:defRPr sz="2000"/>
+            </a:lvl4pPr>
+            <a:lvl5pPr marL="1828800" indent="0">
+              <a:buNone/>
+              <a:defRPr sz="2000"/>
+            </a:lvl5pPr>
+            <a:lvl6pPr marL="2286000" indent="0">
+              <a:buNone/>
+              <a:defRPr sz="2000"/>
+            </a:lvl6pPr>
+            <a:lvl7pPr marL="2743200" indent="0">
+              <a:buNone/>
+              <a:defRPr sz="2000"/>
+            </a:lvl7pPr>
+            <a:lvl8pPr marL="3200400" indent="0">
+              <a:buNone/>
+              <a:defRPr sz="2000"/>
+            </a:lvl8pPr>
+            <a:lvl9pPr marL="3657600" indent="0">
+              <a:buNone/>
+              <a:defRPr sz="2000"/>
+            </a:lvl9pPr>
+          </a:lstStyle>
+          <a:p>
+            <a:r>
+              <a:rPr lang="en-US" smtClean="0"/>
+              <a:t>Drag picture to placeholder or click icon to add</a:t>
+            </a:r>
+            <a:endParaRPr lang="en-US" dirty="0"/>
+          </a:p>
+        </p:txBody>
+      </p:sp>
+      <p:sp>
+        <p:nvSpPr>
+          <p:cNvPr id="4" name="Text Placeholder 3"/>
+          <p:cNvSpPr>
+            <a:spLocks noGrp="1"/>
+          </p:cNvSpPr>
+          <p:nvPr>
+            <p:ph type="body" sz="half" idx="2"/>
+          </p:nvPr>
+        </p:nvSpPr>
+        <p:spPr>
+          <a:xfrm>
+            <a:off x="723900" y="2855968"/>
+            <a:ext cx="3855720" cy="3011432"/>
           </a:xfrm>
         </p:spPr>
         <p:txBody>
           <a:bodyPr/>
           <a:lstStyle>
             <a:lvl1pPr marL="0" indent="0">
-              <a:buNone/>
-              <a:defRPr sz="3200"/>
-            </a:lvl1pPr>
-            <a:lvl2pPr marL="457200" indent="0">
-              <a:buNone/>
-              <a:defRPr sz="2800"/>
-            </a:lvl2pPr>
-            <a:lvl3pPr marL="914400" indent="0">
-              <a:buNone/>
-              <a:defRPr sz="2400"/>
-            </a:lvl3pPr>
-            <a:lvl4pPr marL="1371600" indent="0">
-              <a:buNone/>
-              <a:defRPr sz="2000"/>
-            </a:lvl4pPr>
-            <a:lvl5pPr marL="1828800" indent="0">
-              <a:buNone/>
-              <a:defRPr sz="2000"/>
-            </a:lvl5pPr>
-            <a:lvl6pPr marL="2286000" indent="0">
-              <a:buNone/>
-              <a:defRPr sz="2000"/>
-            </a:lvl6pPr>
-            <a:lvl7pPr marL="2743200" indent="0">
-              <a:buNone/>
-              <a:defRPr sz="2000"/>
-            </a:lvl7pPr>
-            <a:lvl8pPr marL="3200400" indent="0">
-              <a:buNone/>
-              <a:defRPr sz="2000"/>
-            </a:lvl8pPr>
-            <a:lvl9pPr marL="3657600" indent="0">
-              <a:buNone/>
-              <a:defRPr sz="2000"/>
-            </a:lvl9pPr>
-          </a:lstStyle>
-          <a:p>
-            <a:endParaRPr lang="en-US"/>
-          </a:p>
-        </p:txBody>
-      </p:sp>
-      <p:sp>
-        <p:nvSpPr>
-          <p:cNvPr id="4" name="Text Placeholder 3"/>
-          <p:cNvSpPr>
-            <a:spLocks noGrp="1"/>
-          </p:cNvSpPr>
-          <p:nvPr>
-            <p:ph type="body" sz="half" idx="2"/>
-          </p:nvPr>
-        </p:nvSpPr>
-        <p:spPr>
-          <a:xfrm>
-            <a:off x="839788" y="2057400"/>
-            <a:ext cx="3932237" cy="3811588"/>
-          </a:xfrm>
-        </p:spPr>
-        <p:txBody>
-          <a:bodyPr/>
-          <a:lstStyle>
-            <a:lvl1pPr marL="0" indent="0">
+              <a:lnSpc>
+                <a:spcPct val="113000"/>
+              </a:lnSpc>
+              <a:spcBef>
+                <a:spcPts val="0"/>
+              </a:spcBef>
+              <a:spcAft>
+                <a:spcPts val="1500"/>
+              </a:spcAft>
               <a:buNone/>
               <a:defRPr sz="1600"/>
             </a:lvl1pPr>
@@ -2650,14 +3416,27 @@
             <p:ph type="dt" sz="half" idx="10"/>
           </p:nvPr>
         </p:nvSpPr>
-        <p:spPr/>
+        <p:spPr>
+          <a:xfrm>
+            <a:off x="723900" y="6453386"/>
+            <a:ext cx="1204572" cy="404614"/>
+          </a:xfrm>
+        </p:spPr>
         <p:txBody>
           <a:bodyPr/>
-          <a:lstStyle/>
+          <a:lstStyle>
+            <a:lvl1pPr>
+              <a:defRPr>
+                <a:solidFill>
+                  <a:schemeClr val="tx2"/>
+                </a:solidFill>
+              </a:defRPr>
+            </a:lvl1pPr>
+          </a:lstStyle>
           <a:p>
             <a:fld id="{63103B83-DECA-9D4F-ADBD-5F3BB2ACF0D5}" type="datetimeFigureOut">
               <a:rPr lang="en-US" smtClean="0"/>
-              <a:t>3/18/17</a:t>
+              <a:t>3/19/17</a:t>
             </a:fld>
             <a:endParaRPr lang="en-US"/>
           </a:p>
@@ -2673,10 +3452,23 @@
             <p:ph type="ftr" sz="quarter" idx="11"/>
           </p:nvPr>
         </p:nvSpPr>
-        <p:spPr/>
+        <p:spPr>
+          <a:xfrm>
+            <a:off x="2205945" y="6453386"/>
+            <a:ext cx="2373675" cy="404614"/>
+          </a:xfrm>
+        </p:spPr>
         <p:txBody>
           <a:bodyPr/>
-          <a:lstStyle/>
+          <a:lstStyle>
+            <a:lvl1pPr>
+              <a:defRPr>
+                <a:solidFill>
+                  <a:schemeClr val="tx2"/>
+                </a:solidFill>
+              </a:defRPr>
+            </a:lvl1pPr>
+          </a:lstStyle>
           <a:p>
             <a:endParaRPr lang="en-US"/>
           </a:p>
@@ -2692,10 +3484,23 @@
             <p:ph type="sldNum" sz="quarter" idx="12"/>
           </p:nvPr>
         </p:nvSpPr>
-        <p:spPr/>
+        <p:spPr>
+          <a:xfrm>
+            <a:off x="9883140" y="6453386"/>
+            <a:ext cx="1596292" cy="404614"/>
+          </a:xfrm>
+        </p:spPr>
         <p:txBody>
           <a:bodyPr/>
-          <a:lstStyle/>
+          <a:lstStyle>
+            <a:lvl1pPr>
+              <a:defRPr>
+                <a:solidFill>
+                  <a:schemeClr val="tx2"/>
+                </a:solidFill>
+              </a:defRPr>
+            </a:lvl1pPr>
+          </a:lstStyle>
           <a:p>
             <a:fld id="{F34B119F-5F17-E748-9E84-C55301851A38}" type="slidenum">
               <a:rPr lang="en-US" smtClean="0"/>
@@ -2705,7 +3510,50 @@
           </a:p>
         </p:txBody>
       </p:sp>
+      <p:sp>
+        <p:nvSpPr>
+          <p:cNvPr id="9" name="Rectangle 8" title="Divider Bar"/>
+          <p:cNvSpPr/>
+          <p:nvPr/>
+        </p:nvSpPr>
+        <p:spPr>
+          <a:xfrm>
+            <a:off x="5303520" y="376"/>
+            <a:ext cx="228600" cy="6858000"/>
+          </a:xfrm>
+          <a:prstGeom prst="rect">
+            <a:avLst/>
+          </a:prstGeom>
+          <a:solidFill>
+            <a:schemeClr val="tx2"/>
+          </a:solidFill>
+          <a:ln>
+            <a:noFill/>
+          </a:ln>
+        </p:spPr>
+        <p:style>
+          <a:lnRef idx="2">
+            <a:schemeClr val="accent1">
+              <a:shade val="50000"/>
+            </a:schemeClr>
+          </a:lnRef>
+          <a:fillRef idx="1">
+            <a:schemeClr val="accent1"/>
+          </a:fillRef>
+          <a:effectRef idx="0">
+            <a:schemeClr val="accent1"/>
+          </a:effectRef>
+          <a:fontRef idx="minor">
+            <a:schemeClr val="lt1"/>
+          </a:fontRef>
+        </p:style>
+      </p:sp>
     </p:spTree>
+    <p:extLst>
+      <p:ext uri="{BB962C8B-B14F-4D97-AF65-F5344CB8AC3E}">
+        <p14:creationId xmlns:p14="http://schemas.microsoft.com/office/powerpoint/2010/main" val="1158450927"/>
+      </p:ext>
+    </p:extLst>
   </p:cSld>
   <p:clrMapOvr>
     <a:masterClrMapping/>
@@ -2717,9 +3565,12 @@
 <p:sldMaster xmlns:a="http://schemas.openxmlformats.org/drawingml/2006/main" xmlns:r="http://schemas.openxmlformats.org/officeDocument/2006/relationships" xmlns:p="http://schemas.openxmlformats.org/presentationml/2006/main">
   <p:cSld>
     <p:bg>
-      <p:bgRef idx="1001">
-        <a:schemeClr val="bg1"/>
-      </p:bgRef>
+      <p:bgPr>
+        <a:solidFill>
+          <a:schemeClr val="bg2"/>
+        </a:solidFill>
+        <a:effectLst/>
+      </p:bgPr>
     </p:bg>
     <p:spTree>
       <p:nvGrpSpPr>
@@ -2747,15 +3598,15 @@
         </p:nvSpPr>
         <p:spPr>
           <a:xfrm>
-            <a:off x="838200" y="365125"/>
-            <a:ext cx="10515600" cy="1325563"/>
+            <a:off x="1371600" y="685800"/>
+            <a:ext cx="9601200" cy="1485900"/>
           </a:xfrm>
           <a:prstGeom prst="rect">
             <a:avLst/>
           </a:prstGeom>
         </p:spPr>
         <p:txBody>
-          <a:bodyPr vert="horz" lIns="91440" tIns="45720" rIns="91440" bIns="45720" rtlCol="0" anchor="ctr">
+          <a:bodyPr vert="horz" lIns="91440" tIns="45720" rIns="91440" bIns="45720" rtlCol="0" anchor="t">
             <a:normAutofit/>
           </a:bodyPr>
           <a:lstStyle/>
@@ -2764,7 +3615,7 @@
               <a:rPr lang="en-US" smtClean="0"/>
               <a:t>Click to edit Master title style</a:t>
             </a:r>
-            <a:endParaRPr lang="en-US"/>
+            <a:endParaRPr lang="en-US" dirty="0"/>
           </a:p>
         </p:txBody>
       </p:sp>
@@ -2780,8 +3631,8 @@
         </p:nvSpPr>
         <p:spPr>
           <a:xfrm>
-            <a:off x="838200" y="1825625"/>
-            <a:ext cx="10515600" cy="4351338"/>
+            <a:off x="1371600" y="2286000"/>
+            <a:ext cx="9601200" cy="3581400"/>
           </a:xfrm>
           <a:prstGeom prst="rect">
             <a:avLst/>
@@ -2826,7 +3677,7 @@
               <a:rPr lang="en-US" smtClean="0"/>
               <a:t>Fifth level</a:t>
             </a:r>
-            <a:endParaRPr lang="en-US"/>
+            <a:endParaRPr lang="en-US" dirty="0"/>
           </a:p>
         </p:txBody>
       </p:sp>
@@ -2842,8 +3693,8 @@
         </p:nvSpPr>
         <p:spPr>
           <a:xfrm>
-            <a:off x="838200" y="6356350"/>
-            <a:ext cx="2743200" cy="365125"/>
+            <a:off x="1390650" y="6453386"/>
+            <a:ext cx="1204572" cy="404614"/>
           </a:xfrm>
           <a:prstGeom prst="rect">
             <a:avLst/>
@@ -2853,11 +3704,9 @@
           <a:bodyPr vert="horz" lIns="91440" tIns="45720" rIns="91440" bIns="45720" rtlCol="0" anchor="ctr"/>
           <a:lstStyle>
             <a:lvl1pPr algn="l">
-              <a:defRPr sz="1200">
+              <a:defRPr sz="1200" baseline="0">
                 <a:solidFill>
-                  <a:schemeClr val="tx1">
-                    <a:tint val="75000"/>
-                  </a:schemeClr>
+                  <a:schemeClr val="tx2"/>
                 </a:solidFill>
               </a:defRPr>
             </a:lvl1pPr>
@@ -2865,7 +3714,7 @@
           <a:p>
             <a:fld id="{63103B83-DECA-9D4F-ADBD-5F3BB2ACF0D5}" type="datetimeFigureOut">
               <a:rPr lang="en-US" smtClean="0"/>
-              <a:t>3/18/17</a:t>
+              <a:t>3/19/17</a:t>
             </a:fld>
             <a:endParaRPr lang="en-US"/>
           </a:p>
@@ -2883,8 +3732,8 @@
         </p:nvSpPr>
         <p:spPr>
           <a:xfrm>
-            <a:off x="4038600" y="6356350"/>
-            <a:ext cx="4114800" cy="365125"/>
+            <a:off x="2893564" y="6453386"/>
+            <a:ext cx="6280830" cy="404614"/>
           </a:xfrm>
           <a:prstGeom prst="rect">
             <a:avLst/>
@@ -2893,12 +3742,10 @@
         <p:txBody>
           <a:bodyPr vert="horz" lIns="91440" tIns="45720" rIns="91440" bIns="45720" rtlCol="0" anchor="ctr"/>
           <a:lstStyle>
-            <a:lvl1pPr algn="ctr">
-              <a:defRPr sz="1200">
+            <a:lvl1pPr algn="l">
+              <a:defRPr sz="1200" baseline="0">
                 <a:solidFill>
-                  <a:schemeClr val="tx1">
-                    <a:tint val="75000"/>
-                  </a:schemeClr>
+                  <a:schemeClr val="tx2"/>
                 </a:solidFill>
               </a:defRPr>
             </a:lvl1pPr>
@@ -2920,8 +3767,8 @@
         </p:nvSpPr>
         <p:spPr>
           <a:xfrm>
-            <a:off x="8610600" y="6356350"/>
-            <a:ext cx="2743200" cy="365125"/>
+            <a:off x="9472736" y="6453386"/>
+            <a:ext cx="1596292" cy="404614"/>
           </a:xfrm>
           <a:prstGeom prst="rect">
             <a:avLst/>
@@ -2931,11 +3778,9 @@
           <a:bodyPr vert="horz" lIns="91440" tIns="45720" rIns="91440" bIns="45720" rtlCol="0" anchor="ctr"/>
           <a:lstStyle>
             <a:lvl1pPr algn="r">
-              <a:defRPr sz="1200">
+              <a:defRPr sz="1200" baseline="0">
                 <a:solidFill>
-                  <a:schemeClr val="tx1">
-                    <a:tint val="75000"/>
-                  </a:schemeClr>
+                  <a:schemeClr val="tx2"/>
                 </a:solidFill>
               </a:defRPr>
             </a:lvl1pPr>
@@ -2949,40 +3794,78 @@
           </a:p>
         </p:txBody>
       </p:sp>
+      <p:sp>
+        <p:nvSpPr>
+          <p:cNvPr id="9" name="Rectangle 8" title="Side bar"/>
+          <p:cNvSpPr/>
+          <p:nvPr/>
+        </p:nvSpPr>
+        <p:spPr>
+          <a:xfrm>
+            <a:off x="478095" y="376"/>
+            <a:ext cx="228600" cy="6858000"/>
+          </a:xfrm>
+          <a:prstGeom prst="rect">
+            <a:avLst/>
+          </a:prstGeom>
+          <a:solidFill>
+            <a:schemeClr val="tx2"/>
+          </a:solidFill>
+          <a:ln>
+            <a:noFill/>
+          </a:ln>
+        </p:spPr>
+        <p:style>
+          <a:lnRef idx="2">
+            <a:schemeClr val="accent1">
+              <a:shade val="50000"/>
+            </a:schemeClr>
+          </a:lnRef>
+          <a:fillRef idx="1">
+            <a:schemeClr val="accent1"/>
+          </a:fillRef>
+          <a:effectRef idx="0">
+            <a:schemeClr val="accent1"/>
+          </a:effectRef>
+          <a:fontRef idx="minor">
+            <a:schemeClr val="lt1"/>
+          </a:fontRef>
+        </p:style>
+      </p:sp>
     </p:spTree>
     <p:extLst>
       <p:ext uri="{BB962C8B-B14F-4D97-AF65-F5344CB8AC3E}">
-        <p14:creationId xmlns:p14="http://schemas.microsoft.com/office/powerpoint/2010/main" val="1372979062"/>
+        <p14:creationId xmlns:p14="http://schemas.microsoft.com/office/powerpoint/2010/main" val="1956348890"/>
       </p:ext>
     </p:extLst>
   </p:cSld>
   <p:clrMap bg1="lt1" tx1="dk1" bg2="lt2" tx2="dk2" accent1="accent1" accent2="accent2" accent3="accent3" accent4="accent4" accent5="accent5" accent6="accent6" hlink="hlink" folHlink="folHlink"/>
   <p:sldLayoutIdLst>
-    <p:sldLayoutId id="2147483703" r:id="rId1"/>
-    <p:sldLayoutId id="2147483704" r:id="rId2"/>
-    <p:sldLayoutId id="2147483705" r:id="rId3"/>
-    <p:sldLayoutId id="2147483706" r:id="rId4"/>
-    <p:sldLayoutId id="2147483707" r:id="rId5"/>
-    <p:sldLayoutId id="2147483708" r:id="rId6"/>
-    <p:sldLayoutId id="2147483709" r:id="rId7"/>
-    <p:sldLayoutId id="2147483710" r:id="rId8"/>
-    <p:sldLayoutId id="2147483711" r:id="rId9"/>
-    <p:sldLayoutId id="2147483712" r:id="rId10"/>
-    <p:sldLayoutId id="2147483713" r:id="rId11"/>
+    <p:sldLayoutId id="2147483798" r:id="rId1"/>
+    <p:sldLayoutId id="2147483799" r:id="rId2"/>
+    <p:sldLayoutId id="2147483800" r:id="rId3"/>
+    <p:sldLayoutId id="2147483801" r:id="rId4"/>
+    <p:sldLayoutId id="2147483802" r:id="rId5"/>
+    <p:sldLayoutId id="2147483803" r:id="rId6"/>
+    <p:sldLayoutId id="2147483804" r:id="rId7"/>
+    <p:sldLayoutId id="2147483805" r:id="rId8"/>
+    <p:sldLayoutId id="2147483806" r:id="rId9"/>
+    <p:sldLayoutId id="2147483807" r:id="rId10"/>
+    <p:sldLayoutId id="2147483808" r:id="rId11"/>
   </p:sldLayoutIdLst>
   <p:txStyles>
     <p:titleStyle>
       <a:lvl1pPr algn="l" defTabSz="914400" rtl="0" eaLnBrk="1" latinLnBrk="0" hangingPunct="1">
         <a:lnSpc>
-          <a:spcPct val="90000"/>
+          <a:spcPct val="89000"/>
         </a:lnSpc>
         <a:spcBef>
           <a:spcPct val="0"/>
         </a:spcBef>
         <a:buNone/>
-        <a:defRPr sz="4400" kern="1200">
+        <a:defRPr sz="4400" kern="1200" baseline="0">
           <a:solidFill>
-            <a:schemeClr val="tx1"/>
+            <a:schemeClr val="tx2"/>
           </a:solidFill>
           <a:latin typeface="+mj-lt"/>
           <a:ea typeface="+mj-ea"/>
@@ -2991,162 +3874,189 @@
       </a:lvl1pPr>
     </p:titleStyle>
     <p:bodyStyle>
-      <a:lvl1pPr marL="228600" indent="-228600" algn="l" defTabSz="914400" rtl="0" eaLnBrk="1" latinLnBrk="0" hangingPunct="1">
+      <a:lvl1pPr marL="384048" indent="-384048" algn="l" defTabSz="914400" rtl="0" eaLnBrk="1" latinLnBrk="0" hangingPunct="1">
         <a:lnSpc>
-          <a:spcPct val="90000"/>
+          <a:spcPct val="94000"/>
         </a:lnSpc>
         <a:spcBef>
           <a:spcPts val="1000"/>
         </a:spcBef>
-        <a:buFont typeface="Arial"/>
-        <a:buChar char="•"/>
-        <a:defRPr sz="2800" kern="1200">
+        <a:spcAft>
+          <a:spcPts val="200"/>
+        </a:spcAft>
+        <a:buFont typeface="Franklin Gothic Book" panose="020B0503020102020204" pitchFamily="34" charset="0"/>
+        <a:buChar char="■"/>
+        <a:defRPr sz="2000" kern="1200" baseline="0">
           <a:solidFill>
-            <a:schemeClr val="tx1"/>
+            <a:schemeClr val="tx2"/>
           </a:solidFill>
           <a:latin typeface="+mn-lt"/>
           <a:ea typeface="+mn-ea"/>
           <a:cs typeface="+mn-cs"/>
         </a:defRPr>
       </a:lvl1pPr>
-      <a:lvl2pPr marL="685800" indent="-228600" algn="l" defTabSz="914400" rtl="0" eaLnBrk="1" latinLnBrk="0" hangingPunct="1">
+      <a:lvl2pPr marL="384048" indent="-384048" algn="l" defTabSz="914400" rtl="0" eaLnBrk="1" latinLnBrk="0" hangingPunct="1">
         <a:lnSpc>
-          <a:spcPct val="90000"/>
+          <a:spcPct val="94000"/>
         </a:lnSpc>
         <a:spcBef>
           <a:spcPts val="500"/>
         </a:spcBef>
-        <a:buFont typeface="Arial"/>
-        <a:buChar char="•"/>
-        <a:defRPr sz="2400" kern="1200">
+        <a:spcAft>
+          <a:spcPts val="200"/>
+        </a:spcAft>
+        <a:buFont typeface="Franklin Gothic Book" panose="020B0503020102020204" pitchFamily="34" charset="0"/>
+        <a:buChar char="–"/>
+        <a:defRPr sz="2000" i="1" kern="1200" baseline="0">
           <a:solidFill>
-            <a:schemeClr val="tx1"/>
+            <a:schemeClr val="tx2"/>
           </a:solidFill>
           <a:latin typeface="+mn-lt"/>
           <a:ea typeface="+mn-ea"/>
           <a:cs typeface="+mn-cs"/>
         </a:defRPr>
       </a:lvl2pPr>
-      <a:lvl3pPr marL="1143000" indent="-228600" algn="l" defTabSz="914400" rtl="0" eaLnBrk="1" latinLnBrk="0" hangingPunct="1">
+      <a:lvl3pPr marL="384048" indent="-384048" algn="l" defTabSz="914400" rtl="0" eaLnBrk="1" latinLnBrk="0" hangingPunct="1">
         <a:lnSpc>
-          <a:spcPct val="90000"/>
+          <a:spcPct val="94000"/>
         </a:lnSpc>
         <a:spcBef>
           <a:spcPts val="500"/>
         </a:spcBef>
-        <a:buFont typeface="Arial"/>
-        <a:buChar char="•"/>
-        <a:defRPr sz="2000" kern="1200">
+        <a:spcAft>
+          <a:spcPts val="200"/>
+        </a:spcAft>
+        <a:buFont typeface="Franklin Gothic Book" panose="020B0503020102020204" pitchFamily="34" charset="0"/>
+        <a:buChar char="■"/>
+        <a:defRPr sz="1800" kern="1200" baseline="0">
           <a:solidFill>
-            <a:schemeClr val="tx1"/>
+            <a:schemeClr val="tx2"/>
           </a:solidFill>
           <a:latin typeface="+mn-lt"/>
           <a:ea typeface="+mn-ea"/>
           <a:cs typeface="+mn-cs"/>
         </a:defRPr>
       </a:lvl3pPr>
-      <a:lvl4pPr marL="1600200" indent="-228600" algn="l" defTabSz="914400" rtl="0" eaLnBrk="1" latinLnBrk="0" hangingPunct="1">
+      <a:lvl4pPr marL="384048" indent="-384048" algn="l" defTabSz="914400" rtl="0" eaLnBrk="1" latinLnBrk="0" hangingPunct="1">
         <a:lnSpc>
-          <a:spcPct val="90000"/>
+          <a:spcPct val="94000"/>
         </a:lnSpc>
         <a:spcBef>
           <a:spcPts val="500"/>
         </a:spcBef>
-        <a:buFont typeface="Arial"/>
-        <a:buChar char="•"/>
-        <a:defRPr sz="1800" kern="1200">
+        <a:spcAft>
+          <a:spcPts val="200"/>
+        </a:spcAft>
+        <a:buFont typeface="Franklin Gothic Book" panose="020B0503020102020204" pitchFamily="34" charset="0"/>
+        <a:buChar char="–"/>
+        <a:defRPr sz="1800" i="1" kern="1200" baseline="0">
           <a:solidFill>
-            <a:schemeClr val="tx1"/>
+            <a:schemeClr val="tx2"/>
           </a:solidFill>
           <a:latin typeface="+mn-lt"/>
           <a:ea typeface="+mn-ea"/>
           <a:cs typeface="+mn-cs"/>
         </a:defRPr>
       </a:lvl4pPr>
-      <a:lvl5pPr marL="2057400" indent="-228600" algn="l" defTabSz="914400" rtl="0" eaLnBrk="1" latinLnBrk="0" hangingPunct="1">
+      <a:lvl5pPr marL="384048" indent="-384048" algn="l" defTabSz="914400" rtl="0" eaLnBrk="1" latinLnBrk="0" hangingPunct="1">
         <a:lnSpc>
-          <a:spcPct val="90000"/>
+          <a:spcPct val="94000"/>
         </a:lnSpc>
         <a:spcBef>
           <a:spcPts val="500"/>
         </a:spcBef>
-        <a:buFont typeface="Arial"/>
-        <a:buChar char="•"/>
-        <a:defRPr sz="1800" kern="1200">
+        <a:spcAft>
+          <a:spcPts val="200"/>
+        </a:spcAft>
+        <a:buFont typeface="Franklin Gothic Book" panose="020B0503020102020204" pitchFamily="34" charset="0"/>
+        <a:buChar char="■"/>
+        <a:defRPr sz="1600" kern="1200" baseline="0">
           <a:solidFill>
-            <a:schemeClr val="tx1"/>
+            <a:schemeClr val="tx2"/>
           </a:solidFill>
           <a:latin typeface="+mn-lt"/>
           <a:ea typeface="+mn-ea"/>
           <a:cs typeface="+mn-cs"/>
         </a:defRPr>
       </a:lvl5pPr>
-      <a:lvl6pPr marL="2514600" indent="-228600" algn="l" defTabSz="914400" rtl="0" eaLnBrk="1" latinLnBrk="0" hangingPunct="1">
+      <a:lvl6pPr marL="384048" indent="-384048" algn="l" defTabSz="914400" rtl="0" eaLnBrk="1" latinLnBrk="0" hangingPunct="1">
         <a:lnSpc>
-          <a:spcPct val="90000"/>
+          <a:spcPct val="94000"/>
         </a:lnSpc>
         <a:spcBef>
           <a:spcPts val="500"/>
         </a:spcBef>
-        <a:buFont typeface="Arial"/>
-        <a:buChar char="•"/>
-        <a:defRPr sz="1800" kern="1200">
+        <a:spcAft>
+          <a:spcPts val="200"/>
+        </a:spcAft>
+        <a:buFont typeface="Franklin Gothic Book" panose="020B0503020102020204" pitchFamily="34" charset="0"/>
+        <a:buChar char="–"/>
+        <a:defRPr sz="1600" i="1" kern="1200" baseline="0">
           <a:solidFill>
-            <a:schemeClr val="tx1"/>
+            <a:schemeClr val="tx2"/>
           </a:solidFill>
           <a:latin typeface="+mn-lt"/>
           <a:ea typeface="+mn-ea"/>
           <a:cs typeface="+mn-cs"/>
         </a:defRPr>
       </a:lvl6pPr>
-      <a:lvl7pPr marL="2971800" indent="-228600" algn="l" defTabSz="914400" rtl="0" eaLnBrk="1" latinLnBrk="0" hangingPunct="1">
+      <a:lvl7pPr marL="384048" indent="-384048" algn="l" defTabSz="914400" rtl="0" eaLnBrk="1" latinLnBrk="0" hangingPunct="1">
         <a:lnSpc>
-          <a:spcPct val="90000"/>
+          <a:spcPct val="94000"/>
         </a:lnSpc>
         <a:spcBef>
           <a:spcPts val="500"/>
         </a:spcBef>
-        <a:buFont typeface="Arial"/>
-        <a:buChar char="•"/>
-        <a:defRPr sz="1800" kern="1200">
+        <a:spcAft>
+          <a:spcPts val="200"/>
+        </a:spcAft>
+        <a:buFont typeface="Franklin Gothic Book" panose="020B0503020102020204" pitchFamily="34" charset="0"/>
+        <a:buChar char="■"/>
+        <a:defRPr sz="1400" kern="1200" baseline="0">
           <a:solidFill>
-            <a:schemeClr val="tx1"/>
+            <a:schemeClr val="tx2"/>
           </a:solidFill>
           <a:latin typeface="+mn-lt"/>
           <a:ea typeface="+mn-ea"/>
           <a:cs typeface="+mn-cs"/>
         </a:defRPr>
       </a:lvl7pPr>
-      <a:lvl8pPr marL="3429000" indent="-228600" algn="l" defTabSz="914400" rtl="0" eaLnBrk="1" latinLnBrk="0" hangingPunct="1">
+      <a:lvl8pPr marL="384048" indent="-384048" algn="l" defTabSz="914400" rtl="0" eaLnBrk="1" latinLnBrk="0" hangingPunct="1">
         <a:lnSpc>
-          <a:spcPct val="90000"/>
+          <a:spcPct val="94000"/>
         </a:lnSpc>
         <a:spcBef>
           <a:spcPts val="500"/>
         </a:spcBef>
-        <a:buFont typeface="Arial"/>
-        <a:buChar char="•"/>
-        <a:defRPr sz="1800" kern="1200">
+        <a:spcAft>
+          <a:spcPts val="200"/>
+        </a:spcAft>
+        <a:buFont typeface="Franklin Gothic Book" panose="020B0503020102020204" pitchFamily="34" charset="0"/>
+        <a:buChar char="–"/>
+        <a:defRPr sz="1400" i="1" kern="1200" baseline="0">
           <a:solidFill>
-            <a:schemeClr val="tx1"/>
+            <a:schemeClr val="tx2"/>
           </a:solidFill>
           <a:latin typeface="+mn-lt"/>
           <a:ea typeface="+mn-ea"/>
           <a:cs typeface="+mn-cs"/>
         </a:defRPr>
       </a:lvl8pPr>
-      <a:lvl9pPr marL="3886200" indent="-228600" algn="l" defTabSz="914400" rtl="0" eaLnBrk="1" latinLnBrk="0" hangingPunct="1">
+      <a:lvl9pPr marL="384048" indent="-384048" algn="l" defTabSz="914400" rtl="0" eaLnBrk="1" latinLnBrk="0" hangingPunct="1">
         <a:lnSpc>
-          <a:spcPct val="90000"/>
+          <a:spcPct val="94000"/>
         </a:lnSpc>
         <a:spcBef>
           <a:spcPts val="500"/>
         </a:spcBef>
-        <a:buFont typeface="Arial"/>
-        <a:buChar char="•"/>
-        <a:defRPr sz="1800" kern="1200">
+        <a:spcAft>
+          <a:spcPts val="200"/>
+        </a:spcAft>
+        <a:buFont typeface="Franklin Gothic Book" panose="020B0503020102020204" pitchFamily="34" charset="0"/>
+        <a:buChar char="■"/>
+        <a:defRPr sz="1400" kern="1200" baseline="0">
           <a:solidFill>
-            <a:schemeClr val="tx1"/>
+            <a:schemeClr val="tx2"/>
           </a:solidFill>
           <a:latin typeface="+mn-lt"/>
           <a:ea typeface="+mn-ea"/>
@@ -3250,6 +4160,52 @@
       </a:lvl9pPr>
     </p:otherStyle>
   </p:txStyles>
+  <p:extLst mod="1">
+    <p:ext uri="{27BBF7A9-308A-43DC-89C8-2F10F3537804}">
+      <p15:sldGuideLst xmlns:p15="http://schemas.microsoft.com/office/powerpoint/2012/main">
+        <p15:guide id="3" orient="horz" pos="1368">
+          <p15:clr>
+            <a:srgbClr val="F26B43"/>
+          </p15:clr>
+        </p15:guide>
+        <p15:guide id="4" orient="horz" pos="1440">
+          <p15:clr>
+            <a:srgbClr val="F26B43"/>
+          </p15:clr>
+        </p15:guide>
+        <p15:guide id="6" orient="horz" pos="3696">
+          <p15:clr>
+            <a:srgbClr val="F26B43"/>
+          </p15:clr>
+        </p15:guide>
+        <p15:guide id="7" orient="horz" pos="432">
+          <p15:clr>
+            <a:srgbClr val="F26B43"/>
+          </p15:clr>
+        </p15:guide>
+        <p15:guide id="8" orient="horz" pos="1512">
+          <p15:clr>
+            <a:srgbClr val="F26B43"/>
+          </p15:clr>
+        </p15:guide>
+        <p15:guide id="9" pos="6912">
+          <p15:clr>
+            <a:srgbClr val="F26B43"/>
+          </p15:clr>
+        </p15:guide>
+        <p15:guide id="10" pos="936">
+          <p15:clr>
+            <a:srgbClr val="F26B43"/>
+          </p15:clr>
+        </p15:guide>
+        <p15:guide id="11" pos="864">
+          <p15:clr>
+            <a:srgbClr val="F26B43"/>
+          </p15:clr>
+        </p15:guide>
+      </p15:sldGuideLst>
+    </p:ext>
+  </p:extLst>
 </p:sldMaster>
 </file>
 
@@ -3282,8 +4238,38 @@
         </p:nvSpPr>
         <p:spPr>
           <a:xfrm>
-            <a:off x="1417122" y="308759"/>
+            <a:off x="1524000" y="2276455"/>
             <a:ext cx="9144000" cy="956767"/>
+          </a:xfrm>
+        </p:spPr>
+        <p:txBody>
+          <a:bodyPr>
+            <a:normAutofit fontScale="90000"/>
+          </a:bodyPr>
+          <a:lstStyle/>
+          <a:p>
+            <a:r>
+              <a:rPr lang="en-US" b="1" dirty="0" smtClean="0"/>
+              <a:t>Exploratory Data Analysis</a:t>
+            </a:r>
+            <a:endParaRPr lang="en-US" b="1" dirty="0"/>
+          </a:p>
+        </p:txBody>
+      </p:sp>
+      <p:sp>
+        <p:nvSpPr>
+          <p:cNvPr id="3" name="Subtitle 2"/>
+          <p:cNvSpPr>
+            <a:spLocks noGrp="1"/>
+          </p:cNvSpPr>
+          <p:nvPr>
+            <p:ph type="subTitle" idx="1"/>
+          </p:nvPr>
+        </p:nvSpPr>
+        <p:spPr>
+          <a:xfrm>
+            <a:off x="1524000" y="3314245"/>
+            <a:ext cx="9144000" cy="3060865"/>
           </a:xfrm>
         </p:spPr>
         <p:txBody>
@@ -3294,40 +4280,12 @@
           <a:p>
             <a:r>
               <a:rPr lang="en-US" b="1" dirty="0" smtClean="0"/>
-              <a:t>Exploratory Data Analysis</a:t>
-            </a:r>
-            <a:endParaRPr lang="en-US" b="1" dirty="0"/>
-          </a:p>
-        </p:txBody>
-      </p:sp>
-      <p:sp>
-        <p:nvSpPr>
-          <p:cNvPr id="3" name="Subtitle 2"/>
-          <p:cNvSpPr>
-            <a:spLocks noGrp="1"/>
-          </p:cNvSpPr>
-          <p:nvPr>
-            <p:ph type="subTitle" idx="1"/>
-          </p:nvPr>
-        </p:nvSpPr>
-        <p:spPr>
-          <a:xfrm>
-            <a:off x="1524000" y="2196935"/>
-            <a:ext cx="9144000" cy="3060865"/>
-          </a:xfrm>
-        </p:spPr>
-        <p:txBody>
-          <a:bodyPr>
-            <a:normAutofit lnSpcReduction="10000"/>
-          </a:bodyPr>
-          <a:lstStyle/>
-          <a:p>
-            <a:r>
-              <a:rPr lang="en-US" b="1" dirty="0" smtClean="0"/>
-              <a:t>Uber Mining</a:t>
-            </a:r>
-          </a:p>
-          <a:p>
+              <a:t>Mining Uber </a:t>
+            </a:r>
+            <a:r>
+              <a:rPr lang="en-US" b="1" dirty="0" err="1" smtClean="0"/>
+              <a:t>Dataser</a:t>
+            </a:r>
             <a:endParaRPr lang="en-US" dirty="0" smtClean="0"/>
           </a:p>
           <a:p>
@@ -3375,10 +4333,6 @@
             <a:r>
               <a:rPr lang="en-US" dirty="0" err="1" smtClean="0"/>
               <a:t>Wani</a:t>
-            </a:r>
-            <a:r>
-              <a:rPr lang="en-US" dirty="0" smtClean="0"/>
-              <a:t> (no effort)</a:t>
             </a:r>
             <a:endParaRPr lang="en-US" dirty="0"/>
           </a:p>
@@ -3388,6 +4342,395 @@
     <p:extLst>
       <p:ext uri="{BB962C8B-B14F-4D97-AF65-F5344CB8AC3E}">
         <p14:creationId xmlns:p14="http://schemas.microsoft.com/office/powerpoint/2010/main" val="454131349"/>
+      </p:ext>
+    </p:extLst>
+  </p:cSld>
+  <p:clrMapOvr>
+    <a:masterClrMapping/>
+  </p:clrMapOvr>
+</p:sld>
+</file>
+
+<file path=ppt/slides/slide10.xml><?xml version="1.0" encoding="utf-8"?>
+<p:sld xmlns:a="http://schemas.openxmlformats.org/drawingml/2006/main" xmlns:r="http://schemas.openxmlformats.org/officeDocument/2006/relationships" xmlns:p="http://schemas.openxmlformats.org/presentationml/2006/main">
+  <p:cSld>
+    <p:spTree>
+      <p:nvGrpSpPr>
+        <p:cNvPr id="1" name=""/>
+        <p:cNvGrpSpPr/>
+        <p:nvPr/>
+      </p:nvGrpSpPr>
+      <p:grpSpPr>
+        <a:xfrm>
+          <a:off x="0" y="0"/>
+          <a:ext cx="0" cy="0"/>
+          <a:chOff x="0" y="0"/>
+          <a:chExt cx="0" cy="0"/>
+        </a:xfrm>
+      </p:grpSpPr>
+      <p:pic>
+        <p:nvPicPr>
+          <p:cNvPr id="4" name="Content Placeholder 3"/>
+          <p:cNvPicPr>
+            <a:picLocks noGrp="1" noChangeAspect="1"/>
+          </p:cNvPicPr>
+          <p:nvPr>
+            <p:ph idx="1"/>
+          </p:nvPr>
+        </p:nvPicPr>
+        <p:blipFill>
+          <a:blip r:embed="rId2">
+            <a:extLst>
+              <a:ext uri="{28A0092B-C50C-407E-A947-70E740481C1C}">
+                <a14:useLocalDpi xmlns:a14="http://schemas.microsoft.com/office/drawing/2010/main" val="0"/>
+              </a:ext>
+            </a:extLst>
+          </a:blip>
+          <a:stretch>
+            <a:fillRect/>
+          </a:stretch>
+        </p:blipFill>
+        <p:spPr>
+          <a:xfrm>
+            <a:off x="0" y="785814"/>
+            <a:ext cx="6043613" cy="6072186"/>
+          </a:xfrm>
+        </p:spPr>
+      </p:pic>
+      <p:pic>
+        <p:nvPicPr>
+          <p:cNvPr id="5" name="Picture 4"/>
+          <p:cNvPicPr>
+            <a:picLocks noChangeAspect="1"/>
+          </p:cNvPicPr>
+          <p:nvPr/>
+        </p:nvPicPr>
+        <p:blipFill>
+          <a:blip r:embed="rId3">
+            <a:extLst>
+              <a:ext uri="{28A0092B-C50C-407E-A947-70E740481C1C}">
+                <a14:useLocalDpi xmlns:a14="http://schemas.microsoft.com/office/drawing/2010/main" val="0"/>
+              </a:ext>
+            </a:extLst>
+          </a:blip>
+          <a:stretch>
+            <a:fillRect/>
+          </a:stretch>
+        </p:blipFill>
+        <p:spPr>
+          <a:xfrm>
+            <a:off x="6029324" y="785812"/>
+            <a:ext cx="6034088" cy="6072187"/>
+          </a:xfrm>
+          <a:prstGeom prst="rect">
+            <a:avLst/>
+          </a:prstGeom>
+        </p:spPr>
+      </p:pic>
+      <p:sp>
+        <p:nvSpPr>
+          <p:cNvPr id="6" name="TextBox 5"/>
+          <p:cNvSpPr txBox="1"/>
+          <p:nvPr/>
+        </p:nvSpPr>
+        <p:spPr>
+          <a:xfrm>
+            <a:off x="442913" y="308285"/>
+            <a:ext cx="4957762" cy="369332"/>
+          </a:xfrm>
+          <a:prstGeom prst="rect">
+            <a:avLst/>
+          </a:prstGeom>
+          <a:noFill/>
+        </p:spPr>
+        <p:txBody>
+          <a:bodyPr wrap="square" rtlCol="0">
+            <a:spAutoFit/>
+          </a:bodyPr>
+          <a:lstStyle/>
+          <a:p>
+            <a:pPr algn="ctr"/>
+            <a:r>
+              <a:rPr lang="en-US" dirty="0" smtClean="0"/>
+              <a:t>August</a:t>
+            </a:r>
+            <a:endParaRPr lang="en-US" dirty="0"/>
+          </a:p>
+        </p:txBody>
+      </p:sp>
+      <p:sp>
+        <p:nvSpPr>
+          <p:cNvPr id="7" name="TextBox 6"/>
+          <p:cNvSpPr txBox="1"/>
+          <p:nvPr/>
+        </p:nvSpPr>
+        <p:spPr>
+          <a:xfrm>
+            <a:off x="6567487" y="308285"/>
+            <a:ext cx="4957762" cy="369332"/>
+          </a:xfrm>
+          <a:prstGeom prst="rect">
+            <a:avLst/>
+          </a:prstGeom>
+          <a:noFill/>
+        </p:spPr>
+        <p:txBody>
+          <a:bodyPr wrap="square" rtlCol="0">
+            <a:spAutoFit/>
+          </a:bodyPr>
+          <a:lstStyle/>
+          <a:p>
+            <a:pPr algn="ctr"/>
+            <a:r>
+              <a:rPr lang="en-US" dirty="0" smtClean="0"/>
+              <a:t>September</a:t>
+            </a:r>
+            <a:endParaRPr lang="en-US" dirty="0"/>
+          </a:p>
+        </p:txBody>
+      </p:sp>
+    </p:spTree>
+    <p:extLst>
+      <p:ext uri="{BB962C8B-B14F-4D97-AF65-F5344CB8AC3E}">
+        <p14:creationId xmlns:p14="http://schemas.microsoft.com/office/powerpoint/2010/main" val="309338554"/>
+      </p:ext>
+    </p:extLst>
+  </p:cSld>
+  <p:clrMapOvr>
+    <a:masterClrMapping/>
+  </p:clrMapOvr>
+</p:sld>
+</file>
+
+<file path=ppt/slides/slide11.xml><?xml version="1.0" encoding="utf-8"?>
+<p:sld xmlns:a="http://schemas.openxmlformats.org/drawingml/2006/main" xmlns:r="http://schemas.openxmlformats.org/officeDocument/2006/relationships" xmlns:p="http://schemas.openxmlformats.org/presentationml/2006/main">
+  <p:cSld>
+    <p:spTree>
+      <p:nvGrpSpPr>
+        <p:cNvPr id="1" name=""/>
+        <p:cNvGrpSpPr/>
+        <p:nvPr/>
+      </p:nvGrpSpPr>
+      <p:grpSpPr>
+        <a:xfrm>
+          <a:off x="0" y="0"/>
+          <a:ext cx="0" cy="0"/>
+          <a:chOff x="0" y="0"/>
+          <a:chExt cx="0" cy="0"/>
+        </a:xfrm>
+      </p:grpSpPr>
+      <p:sp>
+        <p:nvSpPr>
+          <p:cNvPr id="2" name="Title 1"/>
+          <p:cNvSpPr>
+            <a:spLocks noGrp="1"/>
+          </p:cNvSpPr>
+          <p:nvPr>
+            <p:ph type="title"/>
+          </p:nvPr>
+        </p:nvSpPr>
+        <p:spPr>
+          <a:xfrm>
+            <a:off x="2204978" y="2711370"/>
+            <a:ext cx="9601200" cy="1485900"/>
+          </a:xfrm>
+        </p:spPr>
+        <p:txBody>
+          <a:bodyPr/>
+          <a:lstStyle/>
+          <a:p>
+            <a:r>
+              <a:rPr lang="en-US" smtClean="0"/>
+              <a:t>Density Plot of 4.5 million Pickups</a:t>
+            </a:r>
+            <a:endParaRPr lang="en-US"/>
+          </a:p>
+        </p:txBody>
+      </p:sp>
+    </p:spTree>
+    <p:extLst>
+      <p:ext uri="{BB962C8B-B14F-4D97-AF65-F5344CB8AC3E}">
+        <p14:creationId xmlns:p14="http://schemas.microsoft.com/office/powerpoint/2010/main" val="955066963"/>
+      </p:ext>
+    </p:extLst>
+  </p:cSld>
+  <p:clrMapOvr>
+    <a:masterClrMapping/>
+  </p:clrMapOvr>
+</p:sld>
+</file>
+
+<file path=ppt/slides/slide12.xml><?xml version="1.0" encoding="utf-8"?>
+<p:sld xmlns:a="http://schemas.openxmlformats.org/drawingml/2006/main" xmlns:r="http://schemas.openxmlformats.org/officeDocument/2006/relationships" xmlns:p="http://schemas.openxmlformats.org/presentationml/2006/main">
+  <p:cSld>
+    <p:spTree>
+      <p:nvGrpSpPr>
+        <p:cNvPr id="1" name=""/>
+        <p:cNvGrpSpPr/>
+        <p:nvPr/>
+      </p:nvGrpSpPr>
+      <p:grpSpPr>
+        <a:xfrm>
+          <a:off x="0" y="0"/>
+          <a:ext cx="0" cy="0"/>
+          <a:chOff x="0" y="0"/>
+          <a:chExt cx="0" cy="0"/>
+        </a:xfrm>
+      </p:grpSpPr>
+      <p:pic>
+        <p:nvPicPr>
+          <p:cNvPr id="4" name="Content Placeholder 3"/>
+          <p:cNvPicPr preferRelativeResize="0">
+            <a:picLocks noGrp="1"/>
+          </p:cNvPicPr>
+          <p:nvPr>
+            <p:ph idx="1"/>
+          </p:nvPr>
+        </p:nvPicPr>
+        <p:blipFill>
+          <a:blip r:embed="rId2">
+            <a:extLst>
+              <a:ext uri="{28A0092B-C50C-407E-A947-70E740481C1C}">
+                <a14:useLocalDpi xmlns:a14="http://schemas.microsoft.com/office/drawing/2010/main" val="0"/>
+              </a:ext>
+            </a:extLst>
+          </a:blip>
+          <a:stretch>
+            <a:fillRect/>
+          </a:stretch>
+        </p:blipFill>
+        <p:spPr>
+          <a:xfrm>
+            <a:off x="753590" y="0"/>
+            <a:ext cx="11401063" cy="6858000"/>
+          </a:xfrm>
+        </p:spPr>
+      </p:pic>
+      <p:sp>
+        <p:nvSpPr>
+          <p:cNvPr id="6" name="TextBox 5"/>
+          <p:cNvSpPr txBox="1"/>
+          <p:nvPr/>
+        </p:nvSpPr>
+        <p:spPr>
+          <a:xfrm>
+            <a:off x="3593306" y="451160"/>
+            <a:ext cx="4957762" cy="369332"/>
+          </a:xfrm>
+          <a:prstGeom prst="rect">
+            <a:avLst/>
+          </a:prstGeom>
+          <a:noFill/>
+        </p:spPr>
+        <p:txBody>
+          <a:bodyPr wrap="square" rtlCol="0">
+            <a:spAutoFit/>
+          </a:bodyPr>
+          <a:lstStyle/>
+          <a:p>
+            <a:pPr algn="ctr"/>
+            <a:r>
+              <a:rPr lang="en-US" dirty="0" smtClean="0"/>
+              <a:t>Complete Density plot for 6 months</a:t>
+            </a:r>
+            <a:endParaRPr lang="en-US" dirty="0"/>
+          </a:p>
+        </p:txBody>
+      </p:sp>
+    </p:spTree>
+    <p:extLst>
+      <p:ext uri="{BB962C8B-B14F-4D97-AF65-F5344CB8AC3E}">
+        <p14:creationId xmlns:p14="http://schemas.microsoft.com/office/powerpoint/2010/main" val="214998041"/>
+      </p:ext>
+    </p:extLst>
+  </p:cSld>
+  <p:clrMapOvr>
+    <a:masterClrMapping/>
+  </p:clrMapOvr>
+</p:sld>
+</file>
+
+<file path=ppt/slides/slide13.xml><?xml version="1.0" encoding="utf-8"?>
+<p:sld xmlns:a="http://schemas.openxmlformats.org/drawingml/2006/main" xmlns:r="http://schemas.openxmlformats.org/officeDocument/2006/relationships" xmlns:p="http://schemas.openxmlformats.org/presentationml/2006/main">
+  <p:cSld>
+    <p:spTree>
+      <p:nvGrpSpPr>
+        <p:cNvPr id="1" name=""/>
+        <p:cNvGrpSpPr/>
+        <p:nvPr/>
+      </p:nvGrpSpPr>
+      <p:grpSpPr>
+        <a:xfrm>
+          <a:off x="0" y="0"/>
+          <a:ext cx="0" cy="0"/>
+          <a:chOff x="0" y="0"/>
+          <a:chExt cx="0" cy="0"/>
+        </a:xfrm>
+      </p:grpSpPr>
+      <p:sp>
+        <p:nvSpPr>
+          <p:cNvPr id="2" name="Title 1"/>
+          <p:cNvSpPr>
+            <a:spLocks noGrp="1"/>
+          </p:cNvSpPr>
+          <p:nvPr>
+            <p:ph type="title"/>
+          </p:nvPr>
+        </p:nvSpPr>
+        <p:spPr/>
+        <p:txBody>
+          <a:bodyPr/>
+          <a:lstStyle/>
+          <a:p>
+            <a:r>
+              <a:rPr lang="en-US" dirty="0" smtClean="0"/>
+              <a:t>Conclusions</a:t>
+            </a:r>
+            <a:endParaRPr lang="en-US" dirty="0"/>
+          </a:p>
+        </p:txBody>
+      </p:sp>
+      <p:sp>
+        <p:nvSpPr>
+          <p:cNvPr id="3" name="Content Placeholder 2"/>
+          <p:cNvSpPr>
+            <a:spLocks noGrp="1"/>
+          </p:cNvSpPr>
+          <p:nvPr>
+            <p:ph idx="1"/>
+          </p:nvPr>
+        </p:nvSpPr>
+        <p:spPr/>
+        <p:txBody>
+          <a:bodyPr/>
+          <a:lstStyle/>
+          <a:p>
+            <a:r>
+              <a:rPr lang="en-US" dirty="0" smtClean="0"/>
+              <a:t>We have sufficient data and it is continues in time</a:t>
+            </a:r>
+          </a:p>
+          <a:p>
+            <a:r>
+              <a:rPr lang="en-US" dirty="0" smtClean="0"/>
+              <a:t>Geographic plot actually carves out the map of NYC on a black canvas so the data set covers New York cities with its outer boroughs </a:t>
+            </a:r>
+          </a:p>
+          <a:p>
+            <a:r>
+              <a:rPr lang="en-US" dirty="0" smtClean="0"/>
+              <a:t>Plot of pickups over months suggest that monthly pickups are comparable and can be relatively analyzed to mine patterns</a:t>
+            </a:r>
+          </a:p>
+          <a:p>
+            <a:endParaRPr lang="en-US" dirty="0"/>
+          </a:p>
+        </p:txBody>
+      </p:sp>
+    </p:spTree>
+    <p:extLst>
+      <p:ext uri="{BB962C8B-B14F-4D97-AF65-F5344CB8AC3E}">
+        <p14:creationId xmlns:p14="http://schemas.microsoft.com/office/powerpoint/2010/main" val="421810228"/>
       </p:ext>
     </p:extLst>
   </p:cSld>
@@ -3431,7 +4774,7 @@
           <a:p>
             <a:r>
               <a:rPr lang="en-US" dirty="0" smtClean="0"/>
-              <a:t>Pre-processing of raw data</a:t>
+              <a:t>Project: Mining Uber Data Set</a:t>
             </a:r>
             <a:endParaRPr lang="en-US" dirty="0"/>
           </a:p>
@@ -3447,73 +4790,75 @@
             <p:ph idx="1"/>
           </p:nvPr>
         </p:nvSpPr>
-        <p:spPr>
-          <a:xfrm>
-            <a:off x="838200" y="1825625"/>
-            <a:ext cx="10515600" cy="965076"/>
-          </a:xfrm>
-        </p:spPr>
+        <p:spPr/>
         <p:txBody>
           <a:bodyPr/>
           <a:lstStyle/>
           <a:p>
             <a:r>
               <a:rPr lang="en-US" dirty="0" smtClean="0"/>
-              <a:t>Command to fetch the float values of </a:t>
+              <a:t>What do we have ?</a:t>
+            </a:r>
+          </a:p>
+          <a:p>
+            <a:pPr lvl="1"/>
+            <a:r>
+              <a:rPr lang="en-US" dirty="0" smtClean="0"/>
+              <a:t>4.5 million pickup locations, date and time over 6 months for NYC</a:t>
+            </a:r>
+          </a:p>
+          <a:p>
+            <a:pPr lvl="1"/>
+            <a:r>
+              <a:rPr lang="en-US" dirty="0" smtClean="0"/>
+              <a:t>Continuous Data in time (Proof later!)</a:t>
+            </a:r>
+          </a:p>
+          <a:p>
+            <a:pPr lvl="1"/>
+            <a:endParaRPr lang="en-US" dirty="0" smtClean="0"/>
+          </a:p>
+          <a:p>
+            <a:r>
+              <a:rPr lang="en-US" dirty="0" smtClean="0"/>
+              <a:t>What do we intend to do with it ?</a:t>
+            </a:r>
+          </a:p>
+          <a:p>
+            <a:pPr lvl="1"/>
+            <a:r>
+              <a:rPr lang="en-US" dirty="0" smtClean="0"/>
+              <a:t>Density Estimation (</a:t>
             </a:r>
             <a:r>
               <a:rPr lang="en-US" dirty="0" err="1" smtClean="0"/>
-              <a:t>lat</a:t>
+              <a:t>Probablity</a:t>
             </a:r>
             <a:r>
               <a:rPr lang="en-US" dirty="0" smtClean="0"/>
-              <a:t>, long, number of pick ups per </a:t>
-            </a:r>
-            <a:r>
-              <a:rPr lang="en-US" dirty="0" err="1" smtClean="0"/>
-              <a:t>lat</a:t>
-            </a:r>
+              <a:t> of a pickup given location and time)</a:t>
+            </a:r>
+          </a:p>
+          <a:p>
+            <a:pPr lvl="1"/>
             <a:r>
               <a:rPr lang="en-US" dirty="0" smtClean="0"/>
-              <a:t> - long </a:t>
-            </a:r>
-          </a:p>
-        </p:txBody>
-      </p:sp>
-      <p:pic>
-        <p:nvPicPr>
-          <p:cNvPr id="5" name="Picture 4"/>
-          <p:cNvPicPr>
-            <a:picLocks noChangeAspect="1"/>
-          </p:cNvPicPr>
-          <p:nvPr/>
-        </p:nvPicPr>
-        <p:blipFill>
-          <a:blip r:embed="rId2">
-            <a:extLst>
-              <a:ext uri="{28A0092B-C50C-407E-A947-70E740481C1C}">
-                <a14:useLocalDpi xmlns:a14="http://schemas.microsoft.com/office/drawing/2010/main" val="0"/>
-              </a:ext>
-            </a:extLst>
-          </a:blip>
-          <a:stretch>
-            <a:fillRect/>
-          </a:stretch>
-        </p:blipFill>
-        <p:spPr>
-          <a:xfrm>
-            <a:off x="957263" y="3041650"/>
-            <a:ext cx="10058400" cy="716661"/>
-          </a:xfrm>
-          <a:prstGeom prst="rect">
-            <a:avLst/>
-          </a:prstGeom>
-        </p:spPr>
-      </p:pic>
+              <a:t>Gaussian Process Regression</a:t>
+            </a:r>
+          </a:p>
+          <a:p>
+            <a:pPr lvl="1"/>
+            <a:r>
+              <a:rPr lang="en-US" dirty="0" smtClean="0"/>
+              <a:t>Look for patterns in ride distribution over weekdays </a:t>
+            </a:r>
+          </a:p>
+        </p:txBody>
+      </p:sp>
     </p:spTree>
     <p:extLst>
       <p:ext uri="{BB962C8B-B14F-4D97-AF65-F5344CB8AC3E}">
-        <p14:creationId xmlns:p14="http://schemas.microsoft.com/office/powerpoint/2010/main" val="226609152"/>
+        <p14:creationId xmlns:p14="http://schemas.microsoft.com/office/powerpoint/2010/main" val="1049147301"/>
       </p:ext>
     </p:extLst>
   </p:cSld>
@@ -3556,46 +4901,78 @@
           <a:lstStyle/>
           <a:p>
             <a:r>
+              <a:rPr lang="en-US" dirty="0" smtClean="0">
+                <a:sym typeface="Wingdings"/>
+              </a:rPr>
+              <a:t>Exploratory Analysis: Objective</a:t>
+            </a:r>
+            <a:endParaRPr lang="en-US" dirty="0"/>
+          </a:p>
+        </p:txBody>
+      </p:sp>
+      <p:sp>
+        <p:nvSpPr>
+          <p:cNvPr id="3" name="Content Placeholder 2"/>
+          <p:cNvSpPr>
+            <a:spLocks noGrp="1"/>
+          </p:cNvSpPr>
+          <p:nvPr>
+            <p:ph idx="1"/>
+          </p:nvPr>
+        </p:nvSpPr>
+        <p:spPr/>
+        <p:txBody>
+          <a:bodyPr/>
+          <a:lstStyle/>
+          <a:p>
+            <a:r>
               <a:rPr lang="en-US" dirty="0" smtClean="0"/>
-              <a:t>Average Pickups by Day</a:t>
-            </a:r>
+              <a:t>Preprocessing </a:t>
+            </a:r>
+            <a:r>
+              <a:rPr lang="en-US" dirty="0"/>
+              <a:t>of </a:t>
+            </a:r>
+            <a:r>
+              <a:rPr lang="en-US" dirty="0" smtClean="0"/>
+              <a:t>data</a:t>
+            </a:r>
+          </a:p>
+          <a:p>
+            <a:r>
+              <a:rPr lang="en-US" dirty="0" smtClean="0"/>
+              <a:t>To find out whether 4.5 million data points over 6 months are continuous or not</a:t>
+            </a:r>
+          </a:p>
+          <a:p>
+            <a:r>
+              <a:rPr lang="en-US" dirty="0" smtClean="0"/>
+              <a:t>To plot counts in histograms as well as plot </a:t>
+            </a:r>
+            <a:r>
+              <a:rPr lang="en-US" dirty="0"/>
+              <a:t>U</a:t>
+            </a:r>
+            <a:r>
+              <a:rPr lang="en-US" dirty="0" smtClean="0"/>
+              <a:t>ber pickups on actual map and look at the coverage of NYC</a:t>
+            </a:r>
+          </a:p>
+          <a:p>
+            <a:r>
+              <a:rPr lang="en-US" dirty="0" smtClean="0"/>
+              <a:t>Analysis Uber pickup data over various months</a:t>
+            </a:r>
+          </a:p>
+          <a:p>
             <a:endParaRPr lang="en-US" dirty="0"/>
           </a:p>
         </p:txBody>
       </p:sp>
-      <p:pic>
-        <p:nvPicPr>
-          <p:cNvPr id="4" name="Content Placeholder 3"/>
-          <p:cNvPicPr>
-            <a:picLocks noGrp="1" noChangeAspect="1"/>
-          </p:cNvPicPr>
-          <p:nvPr>
-            <p:ph idx="1"/>
-          </p:nvPr>
-        </p:nvPicPr>
-        <p:blipFill>
-          <a:blip r:embed="rId2">
-            <a:extLst>
-              <a:ext uri="{28A0092B-C50C-407E-A947-70E740481C1C}">
-                <a14:useLocalDpi xmlns:a14="http://schemas.microsoft.com/office/drawing/2010/main" val="0"/>
-              </a:ext>
-            </a:extLst>
-          </a:blip>
-          <a:stretch>
-            <a:fillRect/>
-          </a:stretch>
-        </p:blipFill>
-        <p:spPr>
-          <a:xfrm>
-            <a:off x="3217423" y="1825625"/>
-            <a:ext cx="5757154" cy="4351338"/>
-          </a:xfrm>
-        </p:spPr>
-      </p:pic>
     </p:spTree>
     <p:extLst>
       <p:ext uri="{BB962C8B-B14F-4D97-AF65-F5344CB8AC3E}">
-        <p14:creationId xmlns:p14="http://schemas.microsoft.com/office/powerpoint/2010/main" val="947308019"/>
+        <p14:creationId xmlns:p14="http://schemas.microsoft.com/office/powerpoint/2010/main" val="138076141"/>
       </p:ext>
     </p:extLst>
   </p:cSld>
@@ -3639,21 +5016,62 @@
           <a:p>
             <a:r>
               <a:rPr lang="en-US" dirty="0" smtClean="0"/>
-              <a:t>Average Pickups by Hour</a:t>
+              <a:t>Pre-processing of raw data</a:t>
             </a:r>
             <a:endParaRPr lang="en-US" dirty="0"/>
+          </a:p>
+        </p:txBody>
+      </p:sp>
+      <p:sp>
+        <p:nvSpPr>
+          <p:cNvPr id="3" name="Content Placeholder 2"/>
+          <p:cNvSpPr>
+            <a:spLocks noGrp="1"/>
+          </p:cNvSpPr>
+          <p:nvPr>
+            <p:ph idx="1"/>
+          </p:nvPr>
+        </p:nvSpPr>
+        <p:spPr>
+          <a:xfrm>
+            <a:off x="838200" y="1825625"/>
+            <a:ext cx="10515600" cy="965076"/>
+          </a:xfrm>
+        </p:spPr>
+        <p:txBody>
+          <a:bodyPr/>
+          <a:lstStyle/>
+          <a:p>
+            <a:r>
+              <a:rPr lang="en-US" dirty="0" smtClean="0"/>
+              <a:t>Command to fetch the float values of </a:t>
+            </a:r>
+            <a:r>
+              <a:rPr lang="en-US" dirty="0" err="1" smtClean="0"/>
+              <a:t>lat</a:t>
+            </a:r>
+            <a:r>
+              <a:rPr lang="en-US" dirty="0" smtClean="0"/>
+              <a:t>, long, number of pick ups per </a:t>
+            </a:r>
+            <a:r>
+              <a:rPr lang="en-US" dirty="0" err="1" smtClean="0"/>
+              <a:t>lat</a:t>
+            </a:r>
+            <a:r>
+              <a:rPr lang="en-US" dirty="0" smtClean="0"/>
+              <a:t> - long </a:t>
+            </a:r>
           </a:p>
         </p:txBody>
       </p:sp>
       <p:pic>
         <p:nvPicPr>
-          <p:cNvPr id="4" name="Content Placeholder 3"/>
+          <p:cNvPr id="5" name="Picture 4"/>
           <p:cNvPicPr>
-            <a:picLocks noGrp="1" noChangeAspect="1"/>
+            <a:picLocks noChangeAspect="1"/>
           </p:cNvPicPr>
-          <p:nvPr>
-            <p:ph idx="1"/>
-          </p:nvPr>
+          <p:nvPr/>
         </p:nvPicPr>
         <p:blipFill>
           <a:blip r:embed="rId2">
@@ -3669,15 +5087,18 @@
         </p:blipFill>
         <p:spPr>
           <a:xfrm>
-            <a:off x="3250894" y="1825625"/>
-            <a:ext cx="5690211" cy="4351338"/>
-          </a:xfrm>
+            <a:off x="1371600" y="2613121"/>
+            <a:ext cx="9874170" cy="1090778"/>
+          </a:xfrm>
+          <a:prstGeom prst="rect">
+            <a:avLst/>
+          </a:prstGeom>
         </p:spPr>
       </p:pic>
     </p:spTree>
     <p:extLst>
       <p:ext uri="{BB962C8B-B14F-4D97-AF65-F5344CB8AC3E}">
-        <p14:creationId xmlns:p14="http://schemas.microsoft.com/office/powerpoint/2010/main" val="90871097"/>
+        <p14:creationId xmlns:p14="http://schemas.microsoft.com/office/powerpoint/2010/main" val="226609152"/>
       </p:ext>
     </p:extLst>
   </p:cSld>
@@ -3721,7 +5142,11 @@
           <a:p>
             <a:r>
               <a:rPr lang="en-US" dirty="0" smtClean="0"/>
-              <a:t>Average Pickups by Month</a:t>
+              <a:t>Average Pickups by </a:t>
+            </a:r>
+            <a:r>
+              <a:rPr lang="en-US" dirty="0" smtClean="0"/>
+              <a:t>Day (April)</a:t>
             </a:r>
             <a:endParaRPr lang="en-US" dirty="0"/>
           </a:p>
@@ -3751,15 +5176,15 @@
         </p:blipFill>
         <p:spPr>
           <a:xfrm>
-            <a:off x="3090964" y="1825625"/>
-            <a:ext cx="6010072" cy="4351338"/>
+            <a:off x="3270531" y="1805650"/>
+            <a:ext cx="5986574" cy="4524737"/>
           </a:xfrm>
         </p:spPr>
       </p:pic>
     </p:spTree>
     <p:extLst>
       <p:ext uri="{BB962C8B-B14F-4D97-AF65-F5344CB8AC3E}">
-        <p14:creationId xmlns:p14="http://schemas.microsoft.com/office/powerpoint/2010/main" val="409654262"/>
+        <p14:creationId xmlns:p14="http://schemas.microsoft.com/office/powerpoint/2010/main" val="947308019"/>
       </p:ext>
     </p:extLst>
   </p:cSld>
@@ -3786,6 +5211,29 @@
           <a:chExt cx="0" cy="0"/>
         </a:xfrm>
       </p:grpSpPr>
+      <p:sp>
+        <p:nvSpPr>
+          <p:cNvPr id="2" name="Title 1"/>
+          <p:cNvSpPr>
+            <a:spLocks noGrp="1"/>
+          </p:cNvSpPr>
+          <p:nvPr>
+            <p:ph type="title"/>
+          </p:nvPr>
+        </p:nvSpPr>
+        <p:spPr/>
+        <p:txBody>
+          <a:bodyPr/>
+          <a:lstStyle/>
+          <a:p>
+            <a:r>
+              <a:rPr lang="en-US" dirty="0" smtClean="0"/>
+              <a:t>Average Pickups by Hour</a:t>
+            </a:r>
+            <a:endParaRPr lang="en-US" dirty="0"/>
+          </a:p>
+        </p:txBody>
+      </p:sp>
       <p:pic>
         <p:nvPicPr>
           <p:cNvPr id="4" name="Content Placeholder 3"/>
@@ -3810,107 +5258,15 @@
         </p:blipFill>
         <p:spPr>
           <a:xfrm>
-            <a:off x="232559" y="716356"/>
-            <a:ext cx="5716980" cy="6028828"/>
+            <a:off x="3138037" y="1724627"/>
+            <a:ext cx="6068325" cy="4640484"/>
           </a:xfrm>
         </p:spPr>
       </p:pic>
-      <p:pic>
-        <p:nvPicPr>
-          <p:cNvPr id="5" name="Picture 4"/>
-          <p:cNvPicPr>
-            <a:picLocks noChangeAspect="1"/>
-          </p:cNvPicPr>
-          <p:nvPr/>
-        </p:nvPicPr>
-        <p:blipFill>
-          <a:blip r:embed="rId3">
-            <a:extLst>
-              <a:ext uri="{28A0092B-C50C-407E-A947-70E740481C1C}">
-                <a14:useLocalDpi xmlns:a14="http://schemas.microsoft.com/office/drawing/2010/main" val="0"/>
-              </a:ext>
-            </a:extLst>
-          </a:blip>
-          <a:stretch>
-            <a:fillRect/>
-          </a:stretch>
-        </p:blipFill>
-        <p:spPr>
-          <a:xfrm>
-            <a:off x="5949539" y="716356"/>
-            <a:ext cx="5890160" cy="6028828"/>
-          </a:xfrm>
-          <a:prstGeom prst="rect">
-            <a:avLst/>
-          </a:prstGeom>
-        </p:spPr>
-      </p:pic>
-      <p:sp>
-        <p:nvSpPr>
-          <p:cNvPr id="7" name="TextBox 6"/>
-          <p:cNvSpPr txBox="1"/>
-          <p:nvPr/>
-        </p:nvSpPr>
-        <p:spPr>
-          <a:xfrm>
-            <a:off x="6555180" y="347024"/>
-            <a:ext cx="4678878" cy="369332"/>
-          </a:xfrm>
-          <a:prstGeom prst="rect">
-            <a:avLst/>
-          </a:prstGeom>
-          <a:noFill/>
-        </p:spPr>
-        <p:txBody>
-          <a:bodyPr wrap="square" rtlCol="0">
-            <a:spAutoFit/>
-          </a:bodyPr>
-          <a:lstStyle/>
-          <a:p>
-            <a:pPr algn="ctr"/>
-            <a:r>
-              <a:rPr lang="en-US" dirty="0" smtClean="0"/>
-              <a:t>May</a:t>
-            </a:r>
-            <a:endParaRPr lang="en-US" dirty="0"/>
-          </a:p>
-        </p:txBody>
-      </p:sp>
-      <p:sp>
-        <p:nvSpPr>
-          <p:cNvPr id="8" name="TextBox 7"/>
-          <p:cNvSpPr txBox="1"/>
-          <p:nvPr/>
-        </p:nvSpPr>
-        <p:spPr>
-          <a:xfrm>
-            <a:off x="785813" y="347024"/>
-            <a:ext cx="4957762" cy="369332"/>
-          </a:xfrm>
-          <a:prstGeom prst="rect">
-            <a:avLst/>
-          </a:prstGeom>
-          <a:noFill/>
-        </p:spPr>
-        <p:txBody>
-          <a:bodyPr wrap="square" rtlCol="0">
-            <a:spAutoFit/>
-          </a:bodyPr>
-          <a:lstStyle/>
-          <a:p>
-            <a:pPr algn="ctr"/>
-            <a:r>
-              <a:rPr lang="en-US" dirty="0" smtClean="0"/>
-              <a:t>April</a:t>
-            </a:r>
-            <a:endParaRPr lang="en-US" dirty="0"/>
-          </a:p>
-        </p:txBody>
-      </p:sp>
     </p:spTree>
     <p:extLst>
       <p:ext uri="{BB962C8B-B14F-4D97-AF65-F5344CB8AC3E}">
-        <p14:creationId xmlns:p14="http://schemas.microsoft.com/office/powerpoint/2010/main" val="167407089"/>
+        <p14:creationId xmlns:p14="http://schemas.microsoft.com/office/powerpoint/2010/main" val="90871097"/>
       </p:ext>
     </p:extLst>
   </p:cSld>
@@ -3937,6 +5293,29 @@
           <a:chExt cx="0" cy="0"/>
         </a:xfrm>
       </p:grpSpPr>
+      <p:sp>
+        <p:nvSpPr>
+          <p:cNvPr id="2" name="Title 1"/>
+          <p:cNvSpPr>
+            <a:spLocks noGrp="1"/>
+          </p:cNvSpPr>
+          <p:nvPr>
+            <p:ph type="title"/>
+          </p:nvPr>
+        </p:nvSpPr>
+        <p:spPr/>
+        <p:txBody>
+          <a:bodyPr/>
+          <a:lstStyle/>
+          <a:p>
+            <a:r>
+              <a:rPr lang="en-US" dirty="0" smtClean="0"/>
+              <a:t>Average Pickups by Month</a:t>
+            </a:r>
+            <a:endParaRPr lang="en-US" dirty="0"/>
+          </a:p>
+        </p:txBody>
+      </p:sp>
       <p:pic>
         <p:nvPicPr>
           <p:cNvPr id="4" name="Content Placeholder 3"/>
@@ -3961,107 +5340,15 @@
         </p:blipFill>
         <p:spPr>
           <a:xfrm>
-            <a:off x="205056" y="642938"/>
-            <a:ext cx="5767119" cy="6086475"/>
+            <a:off x="3111363" y="1736203"/>
+            <a:ext cx="6121674" cy="4432139"/>
           </a:xfrm>
         </p:spPr>
       </p:pic>
-      <p:pic>
-        <p:nvPicPr>
-          <p:cNvPr id="5" name="Picture 4"/>
-          <p:cNvPicPr>
-            <a:picLocks noChangeAspect="1"/>
-          </p:cNvPicPr>
-          <p:nvPr/>
-        </p:nvPicPr>
-        <p:blipFill>
-          <a:blip r:embed="rId3">
-            <a:extLst>
-              <a:ext uri="{28A0092B-C50C-407E-A947-70E740481C1C}">
-                <a14:useLocalDpi xmlns:a14="http://schemas.microsoft.com/office/drawing/2010/main" val="0"/>
-              </a:ext>
-            </a:extLst>
-          </a:blip>
-          <a:stretch>
-            <a:fillRect/>
-          </a:stretch>
-        </p:blipFill>
-        <p:spPr>
-          <a:xfrm>
-            <a:off x="6157914" y="642938"/>
-            <a:ext cx="5829300" cy="6086475"/>
-          </a:xfrm>
-          <a:prstGeom prst="rect">
-            <a:avLst/>
-          </a:prstGeom>
-        </p:spPr>
-      </p:pic>
-      <p:sp>
-        <p:nvSpPr>
-          <p:cNvPr id="6" name="TextBox 5"/>
-          <p:cNvSpPr txBox="1"/>
-          <p:nvPr/>
-        </p:nvSpPr>
-        <p:spPr>
-          <a:xfrm>
-            <a:off x="771526" y="147161"/>
-            <a:ext cx="4957762" cy="369332"/>
-          </a:xfrm>
-          <a:prstGeom prst="rect">
-            <a:avLst/>
-          </a:prstGeom>
-          <a:noFill/>
-        </p:spPr>
-        <p:txBody>
-          <a:bodyPr wrap="square" rtlCol="0">
-            <a:spAutoFit/>
-          </a:bodyPr>
-          <a:lstStyle/>
-          <a:p>
-            <a:pPr algn="ctr"/>
-            <a:r>
-              <a:rPr lang="en-US" smtClean="0"/>
-              <a:t>June</a:t>
-            </a:r>
-            <a:endParaRPr lang="en-US" dirty="0"/>
-          </a:p>
-        </p:txBody>
-      </p:sp>
-      <p:sp>
-        <p:nvSpPr>
-          <p:cNvPr id="7" name="TextBox 6"/>
-          <p:cNvSpPr txBox="1"/>
-          <p:nvPr/>
-        </p:nvSpPr>
-        <p:spPr>
-          <a:xfrm>
-            <a:off x="6838950" y="147161"/>
-            <a:ext cx="4957762" cy="369332"/>
-          </a:xfrm>
-          <a:prstGeom prst="rect">
-            <a:avLst/>
-          </a:prstGeom>
-          <a:noFill/>
-        </p:spPr>
-        <p:txBody>
-          <a:bodyPr wrap="square" rtlCol="0">
-            <a:spAutoFit/>
-          </a:bodyPr>
-          <a:lstStyle/>
-          <a:p>
-            <a:pPr algn="ctr"/>
-            <a:r>
-              <a:rPr lang="en-US" dirty="0" smtClean="0"/>
-              <a:t>July</a:t>
-            </a:r>
-            <a:endParaRPr lang="en-US" dirty="0"/>
-          </a:p>
-        </p:txBody>
-      </p:sp>
     </p:spTree>
     <p:extLst>
       <p:ext uri="{BB962C8B-B14F-4D97-AF65-F5344CB8AC3E}">
-        <p14:creationId xmlns:p14="http://schemas.microsoft.com/office/powerpoint/2010/main" val="219614069"/>
+        <p14:creationId xmlns:p14="http://schemas.microsoft.com/office/powerpoint/2010/main" val="409654262"/>
       </p:ext>
     </p:extLst>
   </p:cSld>
@@ -4112,8 +5399,8 @@
         </p:blipFill>
         <p:spPr>
           <a:xfrm>
-            <a:off x="0" y="785814"/>
-            <a:ext cx="6043613" cy="6072186"/>
+            <a:off x="0" y="716356"/>
+            <a:ext cx="5949539" cy="6141644"/>
           </a:xfrm>
         </p:spPr>
       </p:pic>
@@ -4139,8 +5426,8 @@
         </p:blipFill>
         <p:spPr>
           <a:xfrm>
-            <a:off x="6029324" y="785812"/>
-            <a:ext cx="6034088" cy="6072187"/>
+            <a:off x="5949538" y="716356"/>
+            <a:ext cx="6242461" cy="6141644"/>
           </a:xfrm>
           <a:prstGeom prst="rect">
             <a:avLst/>
@@ -4149,14 +5436,14 @@
       </p:pic>
       <p:sp>
         <p:nvSpPr>
-          <p:cNvPr id="6" name="TextBox 5"/>
+          <p:cNvPr id="7" name="TextBox 6"/>
           <p:cNvSpPr txBox="1"/>
           <p:nvPr/>
         </p:nvSpPr>
         <p:spPr>
           <a:xfrm>
-            <a:off x="442913" y="308285"/>
-            <a:ext cx="4957762" cy="369332"/>
+            <a:off x="6555180" y="347024"/>
+            <a:ext cx="4678878" cy="369332"/>
           </a:xfrm>
           <a:prstGeom prst="rect">
             <a:avLst/>
@@ -4172,7 +5459,7 @@
             <a:pPr algn="ctr"/>
             <a:r>
               <a:rPr lang="en-US" dirty="0" smtClean="0"/>
-              <a:t>August</a:t>
+              <a:t>May</a:t>
             </a:r>
             <a:endParaRPr lang="en-US" dirty="0"/>
           </a:p>
@@ -4180,13 +5467,13 @@
       </p:sp>
       <p:sp>
         <p:nvSpPr>
-          <p:cNvPr id="7" name="TextBox 6"/>
+          <p:cNvPr id="8" name="TextBox 7"/>
           <p:cNvSpPr txBox="1"/>
           <p:nvPr/>
         </p:nvSpPr>
         <p:spPr>
           <a:xfrm>
-            <a:off x="6567487" y="308285"/>
+            <a:off x="785813" y="347024"/>
             <a:ext cx="4957762" cy="369332"/>
           </a:xfrm>
           <a:prstGeom prst="rect">
@@ -4203,7 +5490,7 @@
             <a:pPr algn="ctr"/>
             <a:r>
               <a:rPr lang="en-US" dirty="0" smtClean="0"/>
-              <a:t>September</a:t>
+              <a:t>April</a:t>
             </a:r>
             <a:endParaRPr lang="en-US" dirty="0"/>
           </a:p>
@@ -4212,7 +5499,7 @@
     </p:spTree>
     <p:extLst>
       <p:ext uri="{BB962C8B-B14F-4D97-AF65-F5344CB8AC3E}">
-        <p14:creationId xmlns:p14="http://schemas.microsoft.com/office/powerpoint/2010/main" val="309338554"/>
+        <p14:creationId xmlns:p14="http://schemas.microsoft.com/office/powerpoint/2010/main" val="167407089"/>
       </p:ext>
     </p:extLst>
   </p:cSld>
@@ -4263,9 +5550,39 @@
         </p:blipFill>
         <p:spPr>
           <a:xfrm>
-            <a:off x="371475" y="1100138"/>
-            <a:ext cx="11401425" cy="5757862"/>
-          </a:xfrm>
+            <a:off x="0" y="642938"/>
+            <a:ext cx="5972175" cy="6215062"/>
+          </a:xfrm>
+        </p:spPr>
+      </p:pic>
+      <p:pic>
+        <p:nvPicPr>
+          <p:cNvPr id="5" name="Picture 4"/>
+          <p:cNvPicPr>
+            <a:picLocks noChangeAspect="1"/>
+          </p:cNvPicPr>
+          <p:nvPr/>
+        </p:nvPicPr>
+        <p:blipFill>
+          <a:blip r:embed="rId3">
+            <a:extLst>
+              <a:ext uri="{28A0092B-C50C-407E-A947-70E740481C1C}">
+                <a14:useLocalDpi xmlns:a14="http://schemas.microsoft.com/office/drawing/2010/main" val="0"/>
+              </a:ext>
+            </a:extLst>
+          </a:blip>
+          <a:stretch>
+            <a:fillRect/>
+          </a:stretch>
+        </p:blipFill>
+        <p:spPr>
+          <a:xfrm>
+            <a:off x="5972175" y="642938"/>
+            <a:ext cx="6219825" cy="6215062"/>
+          </a:xfrm>
+          <a:prstGeom prst="rect">
+            <a:avLst/>
+          </a:prstGeom>
         </p:spPr>
       </p:pic>
       <p:sp>
@@ -4276,7 +5593,7 @@
         </p:nvSpPr>
         <p:spPr>
           <a:xfrm>
-            <a:off x="3593306" y="451160"/>
+            <a:off x="771526" y="147161"/>
             <a:ext cx="4957762" cy="369332"/>
           </a:xfrm>
           <a:prstGeom prst="rect">
@@ -4292,8 +5609,39 @@
           <a:p>
             <a:pPr algn="ctr"/>
             <a:r>
+              <a:rPr lang="en-US" smtClean="0"/>
+              <a:t>June</a:t>
+            </a:r>
+            <a:endParaRPr lang="en-US" dirty="0"/>
+          </a:p>
+        </p:txBody>
+      </p:sp>
+      <p:sp>
+        <p:nvSpPr>
+          <p:cNvPr id="7" name="TextBox 6"/>
+          <p:cNvSpPr txBox="1"/>
+          <p:nvPr/>
+        </p:nvSpPr>
+        <p:spPr>
+          <a:xfrm>
+            <a:off x="6838950" y="147161"/>
+            <a:ext cx="4957762" cy="369332"/>
+          </a:xfrm>
+          <a:prstGeom prst="rect">
+            <a:avLst/>
+          </a:prstGeom>
+          <a:noFill/>
+        </p:spPr>
+        <p:txBody>
+          <a:bodyPr wrap="square" rtlCol="0">
+            <a:spAutoFit/>
+          </a:bodyPr>
+          <a:lstStyle/>
+          <a:p>
+            <a:pPr algn="ctr"/>
+            <a:r>
               <a:rPr lang="en-US" dirty="0" smtClean="0"/>
-              <a:t>Complete Density plot for 6 months</a:t>
+              <a:t>July</a:t>
             </a:r>
             <a:endParaRPr lang="en-US" dirty="0"/>
           </a:p>
@@ -4302,7 +5650,7 @@
     </p:spTree>
     <p:extLst>
       <p:ext uri="{BB962C8B-B14F-4D97-AF65-F5344CB8AC3E}">
-        <p14:creationId xmlns:p14="http://schemas.microsoft.com/office/powerpoint/2010/main" val="214998041"/>
+        <p14:creationId xmlns:p14="http://schemas.microsoft.com/office/powerpoint/2010/main" val="219614069"/>
       </p:ext>
     </p:extLst>
   </p:cSld>
@@ -4313,9 +5661,9 @@
 </file>
 
 <file path=ppt/theme/theme1.xml><?xml version="1.0" encoding="utf-8"?>
-<a:theme xmlns:a="http://schemas.openxmlformats.org/drawingml/2006/main" name="Office Theme">
+<a:theme xmlns:a="http://schemas.openxmlformats.org/drawingml/2006/main" name="Crop">
   <a:themeElements>
-    <a:clrScheme name="Office">
+    <a:clrScheme name="Crop">
       <a:dk1>
         <a:sysClr val="windowText" lastClr="000000"/>
       </a:dk1>
@@ -4323,109 +5671,49 @@
         <a:sysClr val="window" lastClr="FFFFFF"/>
       </a:lt1>
       <a:dk2>
-        <a:srgbClr val="44546A"/>
+        <a:srgbClr val="191B0E"/>
       </a:dk2>
       <a:lt2>
-        <a:srgbClr val="E7E6E6"/>
+        <a:srgbClr val="EFEDE3"/>
       </a:lt2>
       <a:accent1>
-        <a:srgbClr val="4472C4"/>
+        <a:srgbClr val="8C8D86"/>
       </a:accent1>
       <a:accent2>
-        <a:srgbClr val="ED7D31"/>
+        <a:srgbClr val="E6C069"/>
       </a:accent2>
       <a:accent3>
-        <a:srgbClr val="A5A5A5"/>
+        <a:srgbClr val="897B61"/>
       </a:accent3>
       <a:accent4>
-        <a:srgbClr val="FFC000"/>
+        <a:srgbClr val="8DAB8E"/>
       </a:accent4>
       <a:accent5>
-        <a:srgbClr val="5B9BD5"/>
+        <a:srgbClr val="77A2BB"/>
       </a:accent5>
       <a:accent6>
-        <a:srgbClr val="70AD47"/>
+        <a:srgbClr val="E28394"/>
       </a:accent6>
       <a:hlink>
-        <a:srgbClr val="0563C1"/>
+        <a:srgbClr val="77A2BB"/>
       </a:hlink>
       <a:folHlink>
-        <a:srgbClr val="954F72"/>
+        <a:srgbClr val="957A99"/>
       </a:folHlink>
     </a:clrScheme>
-    <a:fontScheme name="Office">
+    <a:fontScheme name="Crop">
       <a:majorFont>
-        <a:latin typeface="Calibri Light" panose="020F0302020204030204"/>
+        <a:latin typeface="Franklin Gothic Book" panose="020B0503020102020204"/>
         <a:ea typeface=""/>
         <a:cs typeface=""/>
-        <a:font script="Jpan" typeface="Yu Gothic Light"/>
-        <a:font script="Hang" typeface="맑은 고딕"/>
-        <a:font script="Hans" typeface="DengXian Light"/>
-        <a:font script="Hant" typeface="新細明體"/>
-        <a:font script="Arab" typeface="Times New Roman"/>
-        <a:font script="Hebr" typeface="Times New Roman"/>
-        <a:font script="Thai" typeface="Angsana New"/>
-        <a:font script="Ethi" typeface="Nyala"/>
-        <a:font script="Beng" typeface="Vrinda"/>
-        <a:font script="Gujr" typeface="Shruti"/>
-        <a:font script="Khmr" typeface="MoolBoran"/>
-        <a:font script="Knda" typeface="Tunga"/>
-        <a:font script="Guru" typeface="Raavi"/>
-        <a:font script="Cans" typeface="Euphemia"/>
-        <a:font script="Cher" typeface="Plantagenet Cherokee"/>
-        <a:font script="Yiii" typeface="Microsoft Yi Baiti"/>
-        <a:font script="Tibt" typeface="Microsoft Himalaya"/>
-        <a:font script="Thaa" typeface="MV Boli"/>
-        <a:font script="Deva" typeface="Mangal"/>
-        <a:font script="Telu" typeface="Gautami"/>
-        <a:font script="Taml" typeface="Latha"/>
-        <a:font script="Syrc" typeface="Estrangelo Edessa"/>
-        <a:font script="Orya" typeface="Kalinga"/>
-        <a:font script="Mlym" typeface="Kartika"/>
-        <a:font script="Laoo" typeface="DokChampa"/>
-        <a:font script="Sinh" typeface="Iskoola Pota"/>
-        <a:font script="Mong" typeface="Mongolian Baiti"/>
-        <a:font script="Viet" typeface="Times New Roman"/>
-        <a:font script="Uigh" typeface="Microsoft Uighur"/>
-        <a:font script="Geor" typeface="Sylfaen"/>
       </a:majorFont>
       <a:minorFont>
-        <a:latin typeface="Calibri" panose="020F0502020204030204"/>
+        <a:latin typeface="Franklin Gothic Book" panose="020B0503020102020204"/>
         <a:ea typeface=""/>
         <a:cs typeface=""/>
-        <a:font script="Jpan" typeface="Yu Gothic"/>
-        <a:font script="Hang" typeface="맑은 고딕"/>
-        <a:font script="Hans" typeface="DengXian"/>
-        <a:font script="Hant" typeface="新細明體"/>
-        <a:font script="Arab" typeface="Arial"/>
-        <a:font script="Hebr" typeface="Arial"/>
-        <a:font script="Thai" typeface="Cordia New"/>
-        <a:font script="Ethi" typeface="Nyala"/>
-        <a:font script="Beng" typeface="Vrinda"/>
-        <a:font script="Gujr" typeface="Shruti"/>
-        <a:font script="Khmr" typeface="DaunPenh"/>
-        <a:font script="Knda" typeface="Tunga"/>
-        <a:font script="Guru" typeface="Raavi"/>
-        <a:font script="Cans" typeface="Euphemia"/>
-        <a:font script="Cher" typeface="Plantagenet Cherokee"/>
-        <a:font script="Yiii" typeface="Microsoft Yi Baiti"/>
-        <a:font script="Tibt" typeface="Microsoft Himalaya"/>
-        <a:font script="Thaa" typeface="MV Boli"/>
-        <a:font script="Deva" typeface="Mangal"/>
-        <a:font script="Telu" typeface="Gautami"/>
-        <a:font script="Taml" typeface="Latha"/>
-        <a:font script="Syrc" typeface="Estrangelo Edessa"/>
-        <a:font script="Orya" typeface="Kalinga"/>
-        <a:font script="Mlym" typeface="Kartika"/>
-        <a:font script="Laoo" typeface="DokChampa"/>
-        <a:font script="Sinh" typeface="Iskoola Pota"/>
-        <a:font script="Mong" typeface="Mongolian Baiti"/>
-        <a:font script="Viet" typeface="Arial"/>
-        <a:font script="Uigh" typeface="Microsoft Uighur"/>
-        <a:font script="Geor" typeface="Sylfaen"/>
       </a:minorFont>
     </a:fontScheme>
-    <a:fmtScheme name="Office">
+    <a:fmtScheme name="Crop">
       <a:fillStyleLst>
         <a:solidFill>
           <a:schemeClr val="phClr"/>
@@ -4434,23 +5722,23 @@
           <a:gsLst>
             <a:gs pos="0">
               <a:schemeClr val="phClr">
+                <a:tint val="67000"/>
+                <a:satMod val="105000"/>
                 <a:lumMod val="110000"/>
-                <a:satMod val="105000"/>
-                <a:tint val="67000"/>
               </a:schemeClr>
             </a:gs>
             <a:gs pos="50000">
               <a:schemeClr val="phClr">
+                <a:tint val="73000"/>
+                <a:satMod val="103000"/>
                 <a:lumMod val="105000"/>
-                <a:satMod val="103000"/>
-                <a:tint val="73000"/>
               </a:schemeClr>
             </a:gs>
             <a:gs pos="100000">
               <a:schemeClr val="phClr">
+                <a:tint val="81000"/>
+                <a:satMod val="109000"/>
                 <a:lumMod val="105000"/>
-                <a:satMod val="109000"/>
-                <a:tint val="81000"/>
               </a:schemeClr>
             </a:gs>
           </a:gsLst>
@@ -4460,23 +5748,23 @@
           <a:gsLst>
             <a:gs pos="0">
               <a:schemeClr val="phClr">
+                <a:tint val="94000"/>
                 <a:satMod val="103000"/>
                 <a:lumMod val="102000"/>
-                <a:tint val="94000"/>
               </a:schemeClr>
             </a:gs>
             <a:gs pos="50000">
               <a:schemeClr val="phClr">
+                <a:shade val="100000"/>
                 <a:satMod val="110000"/>
                 <a:lumMod val="100000"/>
-                <a:shade val="100000"/>
               </a:schemeClr>
             </a:gs>
             <a:gs pos="100000">
               <a:schemeClr val="phClr">
+                <a:shade val="78000"/>
+                <a:satMod val="120000"/>
                 <a:lumMod val="99000"/>
-                <a:satMod val="120000"/>
-                <a:shade val="78000"/>
               </a:schemeClr>
             </a:gs>
           </a:gsLst>
@@ -4484,26 +5772,23 @@
         </a:gradFill>
       </a:fillStyleLst>
       <a:lnStyleLst>
-        <a:ln w="6350" cap="flat" cmpd="sng" algn="ctr">
+        <a:ln w="6350" cap="flat" cmpd="sng" algn="in">
           <a:solidFill>
             <a:schemeClr val="phClr"/>
           </a:solidFill>
           <a:prstDash val="solid"/>
-          <a:miter lim="800000"/>
         </a:ln>
-        <a:ln w="12700" cap="flat" cmpd="sng" algn="ctr">
+        <a:ln w="34925" cap="flat" cmpd="sng" algn="in">
           <a:solidFill>
             <a:schemeClr val="phClr"/>
           </a:solidFill>
           <a:prstDash val="solid"/>
-          <a:miter lim="800000"/>
         </a:ln>
-        <a:ln w="19050" cap="flat" cmpd="sng" algn="ctr">
+        <a:ln w="19050" cap="flat" cmpd="sng" algn="in">
           <a:solidFill>
             <a:schemeClr val="phClr"/>
           </a:solidFill>
           <a:prstDash val="solid"/>
-          <a:miter lim="800000"/>
         </a:ln>
       </a:lnStyleLst>
       <a:effectStyleLst>
@@ -4517,7 +5802,7 @@
           <a:effectLst>
             <a:outerShdw blurRad="57150" dist="19050" dir="5400000" algn="ctr" rotWithShape="0">
               <a:srgbClr val="000000">
-                <a:alpha val="63000"/>
+                <a:alpha val="35000"/>
               </a:srgbClr>
             </a:outerShdw>
           </a:effectLst>
@@ -4538,16 +5823,16 @@
             <a:gs pos="0">
               <a:schemeClr val="phClr">
                 <a:tint val="93000"/>
+                <a:shade val="98000"/>
                 <a:satMod val="150000"/>
-                <a:shade val="98000"/>
                 <a:lumMod val="102000"/>
               </a:schemeClr>
             </a:gs>
             <a:gs pos="50000">
               <a:schemeClr val="phClr">
                 <a:tint val="98000"/>
+                <a:shade val="90000"/>
                 <a:satMod val="130000"/>
-                <a:shade val="90000"/>
                 <a:lumMod val="103000"/>
               </a:schemeClr>
             </a:gs>
@@ -4567,7 +5852,7 @@
   <a:extraClrSchemeLst/>
   <a:extLst>
     <a:ext uri="{05A4C25C-085E-4340-85A3-A5531E510DB2}">
-      <thm15:themeFamily xmlns:thm15="http://schemas.microsoft.com/office/thememl/2012/main" name="Office Theme" id="{62F939B6-93AF-4DB8-9C6B-D6C7DFDC589F}" vid="{4A3C46E8-61CC-4603-A589-7422A47A8E4A}"/>
+      <thm15:themeFamily xmlns:thm15="http://schemas.microsoft.com/office/thememl/2012/main" name="Crop" id="{EC9488ED-E761-4D60-9AC4-764D1FE2C171}" vid="{CE19780C-D67D-4C13-9DE9-A52BC3BA51B4}"/>
     </a:ext>
   </a:extLst>
 </a:theme>

</xml_diff>